<commit_message>
MapDetailInformation invalidieren bei Neuladen von Daten aus DB.
</commit_message>
<xml_diff>
--- a/doc/abschlusspräsentation/pres.pptx
+++ b/doc/abschlusspräsentation/pres.pptx
@@ -5,28 +5,27 @@
     <p:sldMasterId id="2147483648" r:id="rId1"/>
   </p:sldMasterIdLst>
   <p:notesMasterIdLst>
-    <p:notesMasterId r:id="rId18"/>
+    <p:notesMasterId r:id="rId17"/>
   </p:notesMasterIdLst>
   <p:handoutMasterIdLst>
-    <p:handoutMasterId r:id="rId19"/>
+    <p:handoutMasterId r:id="rId18"/>
   </p:handoutMasterIdLst>
   <p:sldIdLst>
     <p:sldId id="264" r:id="rId2"/>
-    <p:sldId id="273" r:id="rId3"/>
-    <p:sldId id="275" r:id="rId4"/>
-    <p:sldId id="309" r:id="rId5"/>
-    <p:sldId id="305" r:id="rId6"/>
-    <p:sldId id="303" r:id="rId7"/>
-    <p:sldId id="293" r:id="rId8"/>
-    <p:sldId id="302" r:id="rId9"/>
-    <p:sldId id="276" r:id="rId10"/>
-    <p:sldId id="295" r:id="rId11"/>
-    <p:sldId id="291" r:id="rId12"/>
-    <p:sldId id="292" r:id="rId13"/>
-    <p:sldId id="299" r:id="rId14"/>
-    <p:sldId id="300" r:id="rId15"/>
-    <p:sldId id="304" r:id="rId16"/>
-    <p:sldId id="306" r:id="rId17"/>
+    <p:sldId id="275" r:id="rId3"/>
+    <p:sldId id="309" r:id="rId4"/>
+    <p:sldId id="305" r:id="rId5"/>
+    <p:sldId id="303" r:id="rId6"/>
+    <p:sldId id="293" r:id="rId7"/>
+    <p:sldId id="302" r:id="rId8"/>
+    <p:sldId id="276" r:id="rId9"/>
+    <p:sldId id="295" r:id="rId10"/>
+    <p:sldId id="291" r:id="rId11"/>
+    <p:sldId id="292" r:id="rId12"/>
+    <p:sldId id="299" r:id="rId13"/>
+    <p:sldId id="300" r:id="rId14"/>
+    <p:sldId id="304" r:id="rId15"/>
+    <p:sldId id="306" r:id="rId16"/>
   </p:sldIdLst>
   <p:sldSz cx="9144000" cy="6858000" type="screen4x3"/>
   <p:notesSz cx="6858000" cy="9144000"/>
@@ -2604,8 +2603,8 @@
   <dgm:cxnLst>
     <dgm:cxn modelId="{F648F796-03C1-4F94-91C5-CA25A3A956DE}" type="presOf" srcId="{3F3E7BDD-0132-408E-AD12-33707E6B35B6}" destId="{DA92F19B-3709-4927-A4C5-9513D00C5DFB}" srcOrd="0" destOrd="0" presId="urn:microsoft.com/office/officeart/2005/8/layout/venn3"/>
     <dgm:cxn modelId="{1DD3BC56-AB20-4A2B-8448-93097CA0E219}" srcId="{0C5C465C-FBFB-4050-B4A4-C161756840CE}" destId="{744FF9CA-D2D8-4420-B7CE-468C87F154DA}" srcOrd="1" destOrd="0" parTransId="{86AF6011-8FAB-47BF-AE7D-75D0B7CAF1E4}" sibTransId="{307C1188-DEB3-4A7F-8D58-6277548AF1A0}"/>
+    <dgm:cxn modelId="{6FB5E1FD-DC96-43CA-B493-03EB2E0444E6}" type="presOf" srcId="{047CABAB-4B11-451B-B2DC-800A1ABACAD6}" destId="{9BAF6B2F-7E00-4C3C-B9E1-8594160479F0}" srcOrd="0" destOrd="0" presId="urn:microsoft.com/office/officeart/2005/8/layout/venn3"/>
     <dgm:cxn modelId="{0026D735-F2A1-4F9C-87B6-9A4918EBFF50}" type="presOf" srcId="{0C5C465C-FBFB-4050-B4A4-C161756840CE}" destId="{A7D55687-D3D8-4092-B0A0-E94CEE340AC5}" srcOrd="0" destOrd="0" presId="urn:microsoft.com/office/officeart/2005/8/layout/venn3"/>
-    <dgm:cxn modelId="{6FB5E1FD-DC96-43CA-B493-03EB2E0444E6}" type="presOf" srcId="{047CABAB-4B11-451B-B2DC-800A1ABACAD6}" destId="{9BAF6B2F-7E00-4C3C-B9E1-8594160479F0}" srcOrd="0" destOrd="0" presId="urn:microsoft.com/office/officeart/2005/8/layout/venn3"/>
     <dgm:cxn modelId="{2432A523-A91B-48E6-99AE-BEDD6C2BE16C}" type="presOf" srcId="{744FF9CA-D2D8-4420-B7CE-468C87F154DA}" destId="{3630E157-1157-4BC2-B2AD-55095204FC5C}" srcOrd="0" destOrd="0" presId="urn:microsoft.com/office/officeart/2005/8/layout/venn3"/>
     <dgm:cxn modelId="{BD367C41-5793-41FB-ACE7-AEAE62DC1A24}" srcId="{0C5C465C-FBFB-4050-B4A4-C161756840CE}" destId="{047CABAB-4B11-451B-B2DC-800A1ABACAD6}" srcOrd="2" destOrd="0" parTransId="{1B802671-B05C-4CEF-9E97-E53211A2717C}" sibTransId="{FCB9CA04-A769-4353-A156-E9EE20195901}"/>
     <dgm:cxn modelId="{B6824D12-4A6F-4E5B-AD8A-A98C1B7922B7}" srcId="{0C5C465C-FBFB-4050-B4A4-C161756840CE}" destId="{3F3E7BDD-0132-408E-AD12-33707E6B35B6}" srcOrd="0" destOrd="0" parTransId="{C0DB61A5-8E48-4610-9D76-846C3635D58A}" sibTransId="{066C6FF1-0CA8-4C49-B6AD-AF1B2EBDDA7A}"/>
@@ -2916,7 +2915,7 @@
 <dgm:dataModel xmlns:dgm="http://schemas.openxmlformats.org/drawingml/2006/diagram" xmlns:a="http://schemas.openxmlformats.org/drawingml/2006/main">
   <dgm:ptLst>
     <dgm:pt modelId="{F29AF8C9-90A9-46D7-A8C0-87C88440C1FE}" type="doc">
-      <dgm:prSet loTypeId="urn:microsoft.com/office/officeart/2005/8/layout/hProcess9" loCatId="process" qsTypeId="urn:microsoft.com/office/officeart/2005/8/quickstyle/simple1" qsCatId="simple" csTypeId="urn:microsoft.com/office/officeart/2005/8/colors/accent1_2" csCatId="accent1" phldr="1"/>
+      <dgm:prSet loTypeId="urn:microsoft.com/office/officeart/2005/8/layout/hChevron3" loCatId="process" qsTypeId="urn:microsoft.com/office/officeart/2005/8/quickstyle/simple1" qsCatId="simple" csTypeId="urn:microsoft.com/office/officeart/2005/8/colors/accent1_2" csCatId="accent1" phldr="1"/>
       <dgm:spPr/>
     </dgm:pt>
     <dgm:pt modelId="{4D0B0A82-B8D4-4DCB-B844-4A9818602E5C}">
@@ -2964,8 +2963,8 @@
         <a:lstStyle/>
         <a:p>
           <a:r>
-            <a:rPr lang="de-DE" dirty="0" err="1" smtClean="0"/>
-            <a:t>Cralwler</a:t>
+            <a:rPr lang="de-DE" dirty="0" smtClean="0"/>
+            <a:t>Crawler</a:t>
           </a:r>
           <a:endParaRPr lang="de-DE" dirty="0"/>
         </a:p>
@@ -3030,8 +3029,8 @@
         </a:p>
       </dgm:t>
     </dgm:pt>
-    <dgm:pt modelId="{60CBF54E-34D8-4A5A-AFDA-C613F95A3706}" type="pres">
-      <dgm:prSet presAssocID="{F29AF8C9-90A9-46D7-A8C0-87C88440C1FE}" presName="CompostProcess" presStyleCnt="0">
+    <dgm:pt modelId="{065D5234-D121-46FB-976C-BFE6E27AC5F5}" type="pres">
+      <dgm:prSet presAssocID="{F29AF8C9-90A9-46D7-A8C0-87C88440C1FE}" presName="Name0" presStyleCnt="0">
         <dgm:presLayoutVars>
           <dgm:dir/>
           <dgm:resizeHandles val="exact"/>
@@ -3039,16 +3038,8 @@
       </dgm:prSet>
       <dgm:spPr/>
     </dgm:pt>
-    <dgm:pt modelId="{822618A0-FEEB-45CC-81A0-15FF6A91EB8A}" type="pres">
-      <dgm:prSet presAssocID="{F29AF8C9-90A9-46D7-A8C0-87C88440C1FE}" presName="arrow" presStyleLbl="bgShp" presStyleIdx="0" presStyleCnt="1"/>
-      <dgm:spPr/>
-    </dgm:pt>
-    <dgm:pt modelId="{BBECFB30-B12A-4705-928D-B997AC114105}" type="pres">
-      <dgm:prSet presAssocID="{F29AF8C9-90A9-46D7-A8C0-87C88440C1FE}" presName="linearProcess" presStyleCnt="0"/>
-      <dgm:spPr/>
-    </dgm:pt>
-    <dgm:pt modelId="{8A3B181F-EAC8-46DE-BBF3-BDB9DE3336EF}" type="pres">
-      <dgm:prSet presAssocID="{4D0B0A82-B8D4-4DCB-B844-4A9818602E5C}" presName="textNode" presStyleLbl="node1" presStyleIdx="0" presStyleCnt="3">
+    <dgm:pt modelId="{FBEBD8BA-D6E5-44CB-BF4C-ED5FFBCFAFE5}" type="pres">
+      <dgm:prSet presAssocID="{4D0B0A82-B8D4-4DCB-B844-4A9818602E5C}" presName="parTxOnly" presStyleLbl="node1" presStyleIdx="0" presStyleCnt="3">
         <dgm:presLayoutVars>
           <dgm:bulletEnabled val="1"/>
         </dgm:presLayoutVars>
@@ -3062,12 +3053,12 @@
         </a:p>
       </dgm:t>
     </dgm:pt>
-    <dgm:pt modelId="{7F10841B-304C-43D1-B6F8-51C7DA737AD7}" type="pres">
-      <dgm:prSet presAssocID="{EDB25024-6F92-475F-8853-B55DD6ED80BC}" presName="sibTrans" presStyleCnt="0"/>
+    <dgm:pt modelId="{2A5AF05E-F1A5-4899-AC7A-B6A3275A4B47}" type="pres">
+      <dgm:prSet presAssocID="{EDB25024-6F92-475F-8853-B55DD6ED80BC}" presName="parSpace" presStyleCnt="0"/>
       <dgm:spPr/>
     </dgm:pt>
-    <dgm:pt modelId="{F0428DC1-2320-4439-BA06-F77B96603CEF}" type="pres">
-      <dgm:prSet presAssocID="{34C4F8BA-08A4-4859-9008-CB8269A5785E}" presName="textNode" presStyleLbl="node1" presStyleIdx="1" presStyleCnt="3">
+    <dgm:pt modelId="{3D4E2268-33F0-4680-9681-B22E2C1AB5F5}" type="pres">
+      <dgm:prSet presAssocID="{34C4F8BA-08A4-4859-9008-CB8269A5785E}" presName="parTxOnly" presStyleLbl="node1" presStyleIdx="1" presStyleCnt="3">
         <dgm:presLayoutVars>
           <dgm:bulletEnabled val="1"/>
         </dgm:presLayoutVars>
@@ -3081,12 +3072,12 @@
         </a:p>
       </dgm:t>
     </dgm:pt>
-    <dgm:pt modelId="{0AE47241-D8A1-4CA6-A9A2-FEA5F7621F4E}" type="pres">
-      <dgm:prSet presAssocID="{3306F2C1-344A-4745-8535-DEEB3B01025D}" presName="sibTrans" presStyleCnt="0"/>
+    <dgm:pt modelId="{CAA0CF87-792A-4E7E-92EF-C5814E60793F}" type="pres">
+      <dgm:prSet presAssocID="{3306F2C1-344A-4745-8535-DEEB3B01025D}" presName="parSpace" presStyleCnt="0"/>
       <dgm:spPr/>
     </dgm:pt>
-    <dgm:pt modelId="{24396DDF-2494-4281-972C-EDC799D3E3E7}" type="pres">
-      <dgm:prSet presAssocID="{42CE6696-397D-4E80-9C49-C5A760664CCD}" presName="textNode" presStyleLbl="node1" presStyleIdx="2" presStyleCnt="3">
+    <dgm:pt modelId="{5122A87A-53A6-4237-A28C-C614EC7B2A57}" type="pres">
+      <dgm:prSet presAssocID="{42CE6696-397D-4E80-9C49-C5A760664CCD}" presName="parTxOnly" presStyleLbl="node1" presStyleIdx="2" presStyleCnt="3">
         <dgm:presLayoutVars>
           <dgm:bulletEnabled val="1"/>
         </dgm:presLayoutVars>
@@ -3102,20 +3093,18 @@
     </dgm:pt>
   </dgm:ptLst>
   <dgm:cxnLst>
+    <dgm:cxn modelId="{F8681DB9-1753-463D-92CA-E4729EE3673F}" type="presOf" srcId="{4D0B0A82-B8D4-4DCB-B844-4A9818602E5C}" destId="{FBEBD8BA-D6E5-44CB-BF4C-ED5FFBCFAFE5}" srcOrd="0" destOrd="0" presId="urn:microsoft.com/office/officeart/2005/8/layout/hChevron3"/>
     <dgm:cxn modelId="{F50F2650-8CC7-44AE-B2F3-206CC9AAAB56}" srcId="{F29AF8C9-90A9-46D7-A8C0-87C88440C1FE}" destId="{42CE6696-397D-4E80-9C49-C5A760664CCD}" srcOrd="2" destOrd="0" parTransId="{09BD94CF-BDA7-41B4-B2D1-DA7B982599EC}" sibTransId="{BE97A437-9F9B-4254-92DF-24AA8F0D4341}"/>
-    <dgm:cxn modelId="{C4E889A1-5127-479A-9161-C29578BDF220}" type="presOf" srcId="{34C4F8BA-08A4-4859-9008-CB8269A5785E}" destId="{F0428DC1-2320-4439-BA06-F77B96603CEF}" srcOrd="0" destOrd="0" presId="urn:microsoft.com/office/officeart/2005/8/layout/hProcess9"/>
-    <dgm:cxn modelId="{FE37DEE4-FD57-4D9E-8160-7D749B6CD511}" type="presOf" srcId="{4D0B0A82-B8D4-4DCB-B844-4A9818602E5C}" destId="{8A3B181F-EAC8-46DE-BBF3-BDB9DE3336EF}" srcOrd="0" destOrd="0" presId="urn:microsoft.com/office/officeart/2005/8/layout/hProcess9"/>
-    <dgm:cxn modelId="{D29FDB27-0575-4426-916E-769B34603C0A}" type="presOf" srcId="{42CE6696-397D-4E80-9C49-C5A760664CCD}" destId="{24396DDF-2494-4281-972C-EDC799D3E3E7}" srcOrd="0" destOrd="0" presId="urn:microsoft.com/office/officeart/2005/8/layout/hProcess9"/>
+    <dgm:cxn modelId="{33AAE728-AF08-4490-AFE0-8C34AC4ED3B2}" type="presOf" srcId="{42CE6696-397D-4E80-9C49-C5A760664CCD}" destId="{5122A87A-53A6-4237-A28C-C614EC7B2A57}" srcOrd="0" destOrd="0" presId="urn:microsoft.com/office/officeart/2005/8/layout/hChevron3"/>
+    <dgm:cxn modelId="{6979D97D-1A58-4F70-B2B2-7FB5215C3D3B}" type="presOf" srcId="{34C4F8BA-08A4-4859-9008-CB8269A5785E}" destId="{3D4E2268-33F0-4680-9681-B22E2C1AB5F5}" srcOrd="0" destOrd="0" presId="urn:microsoft.com/office/officeart/2005/8/layout/hChevron3"/>
     <dgm:cxn modelId="{7061B3FF-C031-46E1-840E-069509A35224}" srcId="{F29AF8C9-90A9-46D7-A8C0-87C88440C1FE}" destId="{34C4F8BA-08A4-4859-9008-CB8269A5785E}" srcOrd="1" destOrd="0" parTransId="{1AFD8A47-6A69-45AD-8956-2854629A8E56}" sibTransId="{3306F2C1-344A-4745-8535-DEEB3B01025D}"/>
     <dgm:cxn modelId="{FF996394-BBB1-415F-A994-55B00A1C12C0}" srcId="{F29AF8C9-90A9-46D7-A8C0-87C88440C1FE}" destId="{4D0B0A82-B8D4-4DCB-B844-4A9818602E5C}" srcOrd="0" destOrd="0" parTransId="{03FB68E0-5917-4F8B-BCA3-2D2A479844D2}" sibTransId="{EDB25024-6F92-475F-8853-B55DD6ED80BC}"/>
-    <dgm:cxn modelId="{6980774D-C152-456C-BB35-F1B280E9B022}" type="presOf" srcId="{F29AF8C9-90A9-46D7-A8C0-87C88440C1FE}" destId="{60CBF54E-34D8-4A5A-AFDA-C613F95A3706}" srcOrd="0" destOrd="0" presId="urn:microsoft.com/office/officeart/2005/8/layout/hProcess9"/>
-    <dgm:cxn modelId="{54468CE0-EDB2-42DA-B6B9-A4C225864C02}" type="presParOf" srcId="{60CBF54E-34D8-4A5A-AFDA-C613F95A3706}" destId="{822618A0-FEEB-45CC-81A0-15FF6A91EB8A}" srcOrd="0" destOrd="0" presId="urn:microsoft.com/office/officeart/2005/8/layout/hProcess9"/>
-    <dgm:cxn modelId="{81F7922D-95FD-46A8-9EE6-A864C8125546}" type="presParOf" srcId="{60CBF54E-34D8-4A5A-AFDA-C613F95A3706}" destId="{BBECFB30-B12A-4705-928D-B997AC114105}" srcOrd="1" destOrd="0" presId="urn:microsoft.com/office/officeart/2005/8/layout/hProcess9"/>
-    <dgm:cxn modelId="{513D63F7-1ECE-4B52-8500-C6EA5CC7C703}" type="presParOf" srcId="{BBECFB30-B12A-4705-928D-B997AC114105}" destId="{8A3B181F-EAC8-46DE-BBF3-BDB9DE3336EF}" srcOrd="0" destOrd="0" presId="urn:microsoft.com/office/officeart/2005/8/layout/hProcess9"/>
-    <dgm:cxn modelId="{3D7389D7-145A-4A82-B015-D5C367D4031C}" type="presParOf" srcId="{BBECFB30-B12A-4705-928D-B997AC114105}" destId="{7F10841B-304C-43D1-B6F8-51C7DA737AD7}" srcOrd="1" destOrd="0" presId="urn:microsoft.com/office/officeart/2005/8/layout/hProcess9"/>
-    <dgm:cxn modelId="{FB917FFF-7D47-47FE-A8F3-B3F2AC3B9535}" type="presParOf" srcId="{BBECFB30-B12A-4705-928D-B997AC114105}" destId="{F0428DC1-2320-4439-BA06-F77B96603CEF}" srcOrd="2" destOrd="0" presId="urn:microsoft.com/office/officeart/2005/8/layout/hProcess9"/>
-    <dgm:cxn modelId="{CD27DA49-C9E6-4101-AC0E-DA5A09B61773}" type="presParOf" srcId="{BBECFB30-B12A-4705-928D-B997AC114105}" destId="{0AE47241-D8A1-4CA6-A9A2-FEA5F7621F4E}" srcOrd="3" destOrd="0" presId="urn:microsoft.com/office/officeart/2005/8/layout/hProcess9"/>
-    <dgm:cxn modelId="{092DBEC4-2188-4586-9E63-CCE4B5C15448}" type="presParOf" srcId="{BBECFB30-B12A-4705-928D-B997AC114105}" destId="{24396DDF-2494-4281-972C-EDC799D3E3E7}" srcOrd="4" destOrd="0" presId="urn:microsoft.com/office/officeart/2005/8/layout/hProcess9"/>
+    <dgm:cxn modelId="{9D252B93-7403-4C48-B178-25A4935EE086}" type="presOf" srcId="{F29AF8C9-90A9-46D7-A8C0-87C88440C1FE}" destId="{065D5234-D121-46FB-976C-BFE6E27AC5F5}" srcOrd="0" destOrd="0" presId="urn:microsoft.com/office/officeart/2005/8/layout/hChevron3"/>
+    <dgm:cxn modelId="{1CBFBA3A-D245-436B-A3DE-6EAD1FFA409E}" type="presParOf" srcId="{065D5234-D121-46FB-976C-BFE6E27AC5F5}" destId="{FBEBD8BA-D6E5-44CB-BF4C-ED5FFBCFAFE5}" srcOrd="0" destOrd="0" presId="urn:microsoft.com/office/officeart/2005/8/layout/hChevron3"/>
+    <dgm:cxn modelId="{1ACF84C7-AB83-4461-9741-901D053E8C1A}" type="presParOf" srcId="{065D5234-D121-46FB-976C-BFE6E27AC5F5}" destId="{2A5AF05E-F1A5-4899-AC7A-B6A3275A4B47}" srcOrd="1" destOrd="0" presId="urn:microsoft.com/office/officeart/2005/8/layout/hChevron3"/>
+    <dgm:cxn modelId="{E8B9B23C-A8DC-4228-ADBD-828008ECE632}" type="presParOf" srcId="{065D5234-D121-46FB-976C-BFE6E27AC5F5}" destId="{3D4E2268-33F0-4680-9681-B22E2C1AB5F5}" srcOrd="2" destOrd="0" presId="urn:microsoft.com/office/officeart/2005/8/layout/hChevron3"/>
+    <dgm:cxn modelId="{C3EEDEDE-2811-454E-9CC8-4F4DB55A8ADE}" type="presParOf" srcId="{065D5234-D121-46FB-976C-BFE6E27AC5F5}" destId="{CAA0CF87-792A-4E7E-92EF-C5814E60793F}" srcOrd="3" destOrd="0" presId="urn:microsoft.com/office/officeart/2005/8/layout/hChevron3"/>
+    <dgm:cxn modelId="{85E99308-F448-48A7-B429-A40B6CC59AE9}" type="presParOf" srcId="{065D5234-D121-46FB-976C-BFE6E27AC5F5}" destId="{5122A87A-53A6-4237-A28C-C614EC7B2A57}" srcOrd="4" destOrd="0" presId="urn:microsoft.com/office/officeart/2005/8/layout/hChevron3"/>
   </dgm:cxnLst>
   <dgm:bg/>
   <dgm:whole/>
@@ -3135,240 +3124,6 @@
       <dsp:cNvGrpSpPr/>
     </dsp:nvGrpSpPr>
     <dsp:grpSpPr/>
-    <dsp:sp modelId="{DA92F19B-3709-4927-A4C5-9513D00C5DFB}">
-      <dsp:nvSpPr>
-        <dsp:cNvPr id="0" name=""/>
-        <dsp:cNvSpPr/>
-      </dsp:nvSpPr>
-      <dsp:spPr>
-        <a:xfrm>
-          <a:off x="3767" y="772766"/>
-          <a:ext cx="3294779" cy="3294779"/>
-        </a:xfrm>
-        <a:prstGeom prst="ellipse">
-          <a:avLst/>
-        </a:prstGeom>
-        <a:solidFill>
-          <a:schemeClr val="accent1">
-            <a:alpha val="50000"/>
-            <a:hueOff val="0"/>
-            <a:satOff val="0"/>
-            <a:lumOff val="0"/>
-            <a:alphaOff val="0"/>
-          </a:schemeClr>
-        </a:solidFill>
-        <a:ln w="25400" cap="flat" cmpd="sng" algn="ctr">
-          <a:solidFill>
-            <a:schemeClr val="lt1">
-              <a:hueOff val="0"/>
-              <a:satOff val="0"/>
-              <a:lumOff val="0"/>
-              <a:alphaOff val="0"/>
-            </a:schemeClr>
-          </a:solidFill>
-          <a:prstDash val="solid"/>
-        </a:ln>
-        <a:effectLst/>
-      </dsp:spPr>
-      <dsp:style>
-        <a:lnRef idx="2">
-          <a:scrgbClr r="0" g="0" b="0"/>
-        </a:lnRef>
-        <a:fillRef idx="1">
-          <a:scrgbClr r="0" g="0" b="0"/>
-        </a:fillRef>
-        <a:effectRef idx="0">
-          <a:scrgbClr r="0" g="0" b="0"/>
-        </a:effectRef>
-        <a:fontRef idx="minor">
-          <a:schemeClr val="tx1"/>
-        </a:fontRef>
-      </dsp:style>
-      <dsp:txBody>
-        <a:bodyPr spcFirstLastPara="0" vert="horz" wrap="square" lIns="181323" tIns="55880" rIns="181323" bIns="55880" numCol="1" spcCol="1270" anchor="ctr" anchorCtr="0">
-          <a:noAutofit/>
-        </a:bodyPr>
-        <a:lstStyle/>
-        <a:p>
-          <a:pPr lvl="0" algn="ctr" defTabSz="1955800">
-            <a:lnSpc>
-              <a:spcPct val="90000"/>
-            </a:lnSpc>
-            <a:spcBef>
-              <a:spcPct val="0"/>
-            </a:spcBef>
-            <a:spcAft>
-              <a:spcPct val="35000"/>
-            </a:spcAft>
-          </a:pPr>
-          <a:r>
-            <a:rPr lang="de-DE" sz="4400" kern="1200" dirty="0" smtClean="0"/>
-            <a:t>Crawler</a:t>
-          </a:r>
-          <a:endParaRPr lang="de-DE" sz="4400" kern="1200" dirty="0"/>
-        </a:p>
-      </dsp:txBody>
-      <dsp:txXfrm>
-        <a:off x="486276" y="1255275"/>
-        <a:ext cx="2329761" cy="2329761"/>
-      </dsp:txXfrm>
-    </dsp:sp>
-    <dsp:sp modelId="{3630E157-1157-4BC2-B2AD-55095204FC5C}">
-      <dsp:nvSpPr>
-        <dsp:cNvPr id="0" name=""/>
-        <dsp:cNvSpPr/>
-      </dsp:nvSpPr>
-      <dsp:spPr>
-        <a:xfrm>
-          <a:off x="2639591" y="772766"/>
-          <a:ext cx="3294779" cy="3294779"/>
-        </a:xfrm>
-        <a:prstGeom prst="ellipse">
-          <a:avLst/>
-        </a:prstGeom>
-        <a:solidFill>
-          <a:schemeClr val="accent1">
-            <a:alpha val="50000"/>
-            <a:hueOff val="0"/>
-            <a:satOff val="0"/>
-            <a:lumOff val="0"/>
-            <a:alphaOff val="0"/>
-          </a:schemeClr>
-        </a:solidFill>
-        <a:ln w="25400" cap="flat" cmpd="sng" algn="ctr">
-          <a:solidFill>
-            <a:schemeClr val="lt1">
-              <a:hueOff val="0"/>
-              <a:satOff val="0"/>
-              <a:lumOff val="0"/>
-              <a:alphaOff val="0"/>
-            </a:schemeClr>
-          </a:solidFill>
-          <a:prstDash val="solid"/>
-        </a:ln>
-        <a:effectLst/>
-      </dsp:spPr>
-      <dsp:style>
-        <a:lnRef idx="2">
-          <a:scrgbClr r="0" g="0" b="0"/>
-        </a:lnRef>
-        <a:fillRef idx="1">
-          <a:scrgbClr r="0" g="0" b="0"/>
-        </a:fillRef>
-        <a:effectRef idx="0">
-          <a:scrgbClr r="0" g="0" b="0"/>
-        </a:effectRef>
-        <a:fontRef idx="minor">
-          <a:schemeClr val="tx1"/>
-        </a:fontRef>
-      </dsp:style>
-      <dsp:txBody>
-        <a:bodyPr spcFirstLastPara="0" vert="horz" wrap="square" lIns="181323" tIns="55880" rIns="181323" bIns="55880" numCol="1" spcCol="1270" anchor="ctr" anchorCtr="0">
-          <a:noAutofit/>
-        </a:bodyPr>
-        <a:lstStyle/>
-        <a:p>
-          <a:pPr lvl="0" algn="ctr" defTabSz="1955800">
-            <a:lnSpc>
-              <a:spcPct val="90000"/>
-            </a:lnSpc>
-            <a:spcBef>
-              <a:spcPct val="0"/>
-            </a:spcBef>
-            <a:spcAft>
-              <a:spcPct val="35000"/>
-            </a:spcAft>
-          </a:pPr>
-          <a:r>
-            <a:rPr lang="de-DE" sz="4400" kern="1200" dirty="0" smtClean="0"/>
-            <a:t>DB</a:t>
-          </a:r>
-          <a:endParaRPr lang="de-DE" sz="4400" kern="1200" dirty="0"/>
-        </a:p>
-      </dsp:txBody>
-      <dsp:txXfrm>
-        <a:off x="3122100" y="1255275"/>
-        <a:ext cx="2329761" cy="2329761"/>
-      </dsp:txXfrm>
-    </dsp:sp>
-    <dsp:sp modelId="{9BAF6B2F-7E00-4C3C-B9E1-8594160479F0}">
-      <dsp:nvSpPr>
-        <dsp:cNvPr id="0" name=""/>
-        <dsp:cNvSpPr/>
-      </dsp:nvSpPr>
-      <dsp:spPr>
-        <a:xfrm>
-          <a:off x="5275415" y="772766"/>
-          <a:ext cx="3294779" cy="3294779"/>
-        </a:xfrm>
-        <a:prstGeom prst="ellipse">
-          <a:avLst/>
-        </a:prstGeom>
-        <a:solidFill>
-          <a:schemeClr val="accent1">
-            <a:alpha val="50000"/>
-            <a:hueOff val="0"/>
-            <a:satOff val="0"/>
-            <a:lumOff val="0"/>
-            <a:alphaOff val="0"/>
-          </a:schemeClr>
-        </a:solidFill>
-        <a:ln w="25400" cap="flat" cmpd="sng" algn="ctr">
-          <a:solidFill>
-            <a:schemeClr val="lt1">
-              <a:hueOff val="0"/>
-              <a:satOff val="0"/>
-              <a:lumOff val="0"/>
-              <a:alphaOff val="0"/>
-            </a:schemeClr>
-          </a:solidFill>
-          <a:prstDash val="solid"/>
-        </a:ln>
-        <a:effectLst/>
-      </dsp:spPr>
-      <dsp:style>
-        <a:lnRef idx="2">
-          <a:scrgbClr r="0" g="0" b="0"/>
-        </a:lnRef>
-        <a:fillRef idx="1">
-          <a:scrgbClr r="0" g="0" b="0"/>
-        </a:fillRef>
-        <a:effectRef idx="0">
-          <a:scrgbClr r="0" g="0" b="0"/>
-        </a:effectRef>
-        <a:fontRef idx="minor">
-          <a:schemeClr val="tx1"/>
-        </a:fontRef>
-      </dsp:style>
-      <dsp:txBody>
-        <a:bodyPr spcFirstLastPara="0" vert="horz" wrap="square" lIns="181323" tIns="55880" rIns="181323" bIns="55880" numCol="1" spcCol="1270" anchor="ctr" anchorCtr="0">
-          <a:noAutofit/>
-        </a:bodyPr>
-        <a:lstStyle/>
-        <a:p>
-          <a:pPr lvl="0" algn="ctr" defTabSz="1955800">
-            <a:lnSpc>
-              <a:spcPct val="90000"/>
-            </a:lnSpc>
-            <a:spcBef>
-              <a:spcPct val="0"/>
-            </a:spcBef>
-            <a:spcAft>
-              <a:spcPct val="35000"/>
-            </a:spcAft>
-          </a:pPr>
-          <a:r>
-            <a:rPr lang="de-DE" sz="4400" kern="1200" dirty="0" smtClean="0"/>
-            <a:t>GUI</a:t>
-          </a:r>
-          <a:endParaRPr lang="de-DE" sz="4400" kern="1200" dirty="0"/>
-        </a:p>
-      </dsp:txBody>
-      <dsp:txXfrm>
-        <a:off x="5757924" y="1255275"/>
-        <a:ext cx="2329761" cy="2329761"/>
-      </dsp:txXfrm>
-    </dsp:sp>
   </dsp:spTree>
 </dsp:drawing>
 </file>
@@ -3381,318 +3136,6 @@
       <dsp:cNvGrpSpPr/>
     </dsp:nvGrpSpPr>
     <dsp:grpSpPr/>
-    <dsp:sp modelId="{F957E082-FEA5-4D9C-8A02-C3E143B1C8E0}">
-      <dsp:nvSpPr>
-        <dsp:cNvPr id="0" name=""/>
-        <dsp:cNvSpPr/>
-      </dsp:nvSpPr>
-      <dsp:spPr>
-        <a:xfrm>
-          <a:off x="0" y="38319"/>
-          <a:ext cx="6096000" cy="912600"/>
-        </a:xfrm>
-        <a:prstGeom prst="roundRect">
-          <a:avLst/>
-        </a:prstGeom>
-        <a:solidFill>
-          <a:schemeClr val="accent1">
-            <a:hueOff val="0"/>
-            <a:satOff val="0"/>
-            <a:lumOff val="0"/>
-            <a:alphaOff val="0"/>
-          </a:schemeClr>
-        </a:solidFill>
-        <a:ln w="25400" cap="flat" cmpd="sng" algn="ctr">
-          <a:solidFill>
-            <a:schemeClr val="lt1">
-              <a:hueOff val="0"/>
-              <a:satOff val="0"/>
-              <a:lumOff val="0"/>
-              <a:alphaOff val="0"/>
-            </a:schemeClr>
-          </a:solidFill>
-          <a:prstDash val="solid"/>
-        </a:ln>
-        <a:effectLst/>
-      </dsp:spPr>
-      <dsp:style>
-        <a:lnRef idx="2">
-          <a:scrgbClr r="0" g="0" b="0"/>
-        </a:lnRef>
-        <a:fillRef idx="1">
-          <a:scrgbClr r="0" g="0" b="0"/>
-        </a:fillRef>
-        <a:effectRef idx="0">
-          <a:scrgbClr r="0" g="0" b="0"/>
-        </a:effectRef>
-        <a:fontRef idx="minor">
-          <a:schemeClr val="lt1"/>
-        </a:fontRef>
-      </dsp:style>
-      <dsp:txBody>
-        <a:bodyPr spcFirstLastPara="0" vert="horz" wrap="square" lIns="148590" tIns="148590" rIns="148590" bIns="148590" numCol="1" spcCol="1270" anchor="ctr" anchorCtr="0">
-          <a:noAutofit/>
-        </a:bodyPr>
-        <a:lstStyle/>
-        <a:p>
-          <a:pPr lvl="0" algn="l" defTabSz="1733550">
-            <a:lnSpc>
-              <a:spcPct val="90000"/>
-            </a:lnSpc>
-            <a:spcBef>
-              <a:spcPct val="0"/>
-            </a:spcBef>
-            <a:spcAft>
-              <a:spcPct val="35000"/>
-            </a:spcAft>
-          </a:pPr>
-          <a:r>
-            <a:rPr lang="de-DE" sz="3900" kern="1200" dirty="0" smtClean="0"/>
-            <a:t>Accounts</a:t>
-          </a:r>
-          <a:endParaRPr lang="de-DE" sz="3900" kern="1200" dirty="0"/>
-        </a:p>
-      </dsp:txBody>
-      <dsp:txXfrm>
-        <a:off x="44549" y="82868"/>
-        <a:ext cx="6006902" cy="823502"/>
-      </dsp:txXfrm>
-    </dsp:sp>
-    <dsp:sp modelId="{63E2B32D-0F98-4F07-8AFD-7B0E0E69B0D0}">
-      <dsp:nvSpPr>
-        <dsp:cNvPr id="0" name=""/>
-        <dsp:cNvSpPr/>
-      </dsp:nvSpPr>
-      <dsp:spPr>
-        <a:xfrm>
-          <a:off x="0" y="1063239"/>
-          <a:ext cx="6096000" cy="912600"/>
-        </a:xfrm>
-        <a:prstGeom prst="roundRect">
-          <a:avLst/>
-        </a:prstGeom>
-        <a:solidFill>
-          <a:schemeClr val="accent1">
-            <a:hueOff val="0"/>
-            <a:satOff val="0"/>
-            <a:lumOff val="0"/>
-            <a:alphaOff val="0"/>
-          </a:schemeClr>
-        </a:solidFill>
-        <a:ln w="25400" cap="flat" cmpd="sng" algn="ctr">
-          <a:solidFill>
-            <a:schemeClr val="lt1">
-              <a:hueOff val="0"/>
-              <a:satOff val="0"/>
-              <a:lumOff val="0"/>
-              <a:alphaOff val="0"/>
-            </a:schemeClr>
-          </a:solidFill>
-          <a:prstDash val="solid"/>
-        </a:ln>
-        <a:effectLst/>
-      </dsp:spPr>
-      <dsp:style>
-        <a:lnRef idx="2">
-          <a:scrgbClr r="0" g="0" b="0"/>
-        </a:lnRef>
-        <a:fillRef idx="1">
-          <a:scrgbClr r="0" g="0" b="0"/>
-        </a:fillRef>
-        <a:effectRef idx="0">
-          <a:scrgbClr r="0" g="0" b="0"/>
-        </a:effectRef>
-        <a:fontRef idx="minor">
-          <a:schemeClr val="lt1"/>
-        </a:fontRef>
-      </dsp:style>
-      <dsp:txBody>
-        <a:bodyPr spcFirstLastPara="0" vert="horz" wrap="square" lIns="148590" tIns="148590" rIns="148590" bIns="148590" numCol="1" spcCol="1270" anchor="ctr" anchorCtr="0">
-          <a:noAutofit/>
-        </a:bodyPr>
-        <a:lstStyle/>
-        <a:p>
-          <a:pPr lvl="0" algn="l" defTabSz="1733550">
-            <a:lnSpc>
-              <a:spcPct val="90000"/>
-            </a:lnSpc>
-            <a:spcBef>
-              <a:spcPct val="0"/>
-            </a:spcBef>
-            <a:spcAft>
-              <a:spcPct val="35000"/>
-            </a:spcAft>
-          </a:pPr>
-          <a:r>
-            <a:rPr lang="de-DE" sz="3900" kern="1200" dirty="0" smtClean="0"/>
-            <a:t>Location</a:t>
-          </a:r>
-          <a:endParaRPr lang="de-DE" sz="3900" kern="1200" dirty="0"/>
-        </a:p>
-      </dsp:txBody>
-      <dsp:txXfrm>
-        <a:off x="44549" y="1107788"/>
-        <a:ext cx="6006902" cy="823502"/>
-      </dsp:txXfrm>
-    </dsp:sp>
-    <dsp:sp modelId="{24B6A7FC-CFD8-4D0D-A027-28AA9656DA11}">
-      <dsp:nvSpPr>
-        <dsp:cNvPr id="0" name=""/>
-        <dsp:cNvSpPr/>
-      </dsp:nvSpPr>
-      <dsp:spPr>
-        <a:xfrm>
-          <a:off x="0" y="2088159"/>
-          <a:ext cx="6096000" cy="912600"/>
-        </a:xfrm>
-        <a:prstGeom prst="roundRect">
-          <a:avLst/>
-        </a:prstGeom>
-        <a:solidFill>
-          <a:schemeClr val="accent1">
-            <a:hueOff val="0"/>
-            <a:satOff val="0"/>
-            <a:lumOff val="0"/>
-            <a:alphaOff val="0"/>
-          </a:schemeClr>
-        </a:solidFill>
-        <a:ln w="25400" cap="flat" cmpd="sng" algn="ctr">
-          <a:solidFill>
-            <a:schemeClr val="lt1">
-              <a:hueOff val="0"/>
-              <a:satOff val="0"/>
-              <a:lumOff val="0"/>
-              <a:alphaOff val="0"/>
-            </a:schemeClr>
-          </a:solidFill>
-          <a:prstDash val="solid"/>
-        </a:ln>
-        <a:effectLst/>
-      </dsp:spPr>
-      <dsp:style>
-        <a:lnRef idx="2">
-          <a:scrgbClr r="0" g="0" b="0"/>
-        </a:lnRef>
-        <a:fillRef idx="1">
-          <a:scrgbClr r="0" g="0" b="0"/>
-        </a:fillRef>
-        <a:effectRef idx="0">
-          <a:scrgbClr r="0" g="0" b="0"/>
-        </a:effectRef>
-        <a:fontRef idx="minor">
-          <a:schemeClr val="lt1"/>
-        </a:fontRef>
-      </dsp:style>
-      <dsp:txBody>
-        <a:bodyPr spcFirstLastPara="0" vert="horz" wrap="square" lIns="148590" tIns="148590" rIns="148590" bIns="148590" numCol="1" spcCol="1270" anchor="ctr" anchorCtr="0">
-          <a:noAutofit/>
-        </a:bodyPr>
-        <a:lstStyle/>
-        <a:p>
-          <a:pPr lvl="0" algn="l" defTabSz="1733550">
-            <a:lnSpc>
-              <a:spcPct val="90000"/>
-            </a:lnSpc>
-            <a:spcBef>
-              <a:spcPct val="0"/>
-            </a:spcBef>
-            <a:spcAft>
-              <a:spcPct val="35000"/>
-            </a:spcAft>
-          </a:pPr>
-          <a:r>
-            <a:rPr lang="de-DE" sz="3900" kern="1200" dirty="0" err="1" smtClean="0"/>
-            <a:t>Category</a:t>
-          </a:r>
-          <a:endParaRPr lang="de-DE" sz="3900" kern="1200" dirty="0"/>
-        </a:p>
-      </dsp:txBody>
-      <dsp:txXfrm>
-        <a:off x="44549" y="2132708"/>
-        <a:ext cx="6006902" cy="823502"/>
-      </dsp:txXfrm>
-    </dsp:sp>
-    <dsp:sp modelId="{D42EC3E3-4EB3-4A24-8A38-86702BE0445A}">
-      <dsp:nvSpPr>
-        <dsp:cNvPr id="0" name=""/>
-        <dsp:cNvSpPr/>
-      </dsp:nvSpPr>
-      <dsp:spPr>
-        <a:xfrm>
-          <a:off x="0" y="3113080"/>
-          <a:ext cx="6096000" cy="912600"/>
-        </a:xfrm>
-        <a:prstGeom prst="roundRect">
-          <a:avLst/>
-        </a:prstGeom>
-        <a:solidFill>
-          <a:schemeClr val="accent1">
-            <a:hueOff val="0"/>
-            <a:satOff val="0"/>
-            <a:lumOff val="0"/>
-            <a:alphaOff val="0"/>
-          </a:schemeClr>
-        </a:solidFill>
-        <a:ln w="25400" cap="flat" cmpd="sng" algn="ctr">
-          <a:solidFill>
-            <a:schemeClr val="lt1">
-              <a:hueOff val="0"/>
-              <a:satOff val="0"/>
-              <a:lumOff val="0"/>
-              <a:alphaOff val="0"/>
-            </a:schemeClr>
-          </a:solidFill>
-          <a:prstDash val="solid"/>
-        </a:ln>
-        <a:effectLst/>
-      </dsp:spPr>
-      <dsp:style>
-        <a:lnRef idx="2">
-          <a:scrgbClr r="0" g="0" b="0"/>
-        </a:lnRef>
-        <a:fillRef idx="1">
-          <a:scrgbClr r="0" g="0" b="0"/>
-        </a:fillRef>
-        <a:effectRef idx="0">
-          <a:scrgbClr r="0" g="0" b="0"/>
-        </a:effectRef>
-        <a:fontRef idx="minor">
-          <a:schemeClr val="lt1"/>
-        </a:fontRef>
-      </dsp:style>
-      <dsp:txBody>
-        <a:bodyPr spcFirstLastPara="0" vert="horz" wrap="square" lIns="148590" tIns="148590" rIns="148590" bIns="148590" numCol="1" spcCol="1270" anchor="ctr" anchorCtr="0">
-          <a:noAutofit/>
-        </a:bodyPr>
-        <a:lstStyle/>
-        <a:p>
-          <a:pPr lvl="0" algn="l" defTabSz="1733550">
-            <a:lnSpc>
-              <a:spcPct val="90000"/>
-            </a:lnSpc>
-            <a:spcBef>
-              <a:spcPct val="0"/>
-            </a:spcBef>
-            <a:spcAft>
-              <a:spcPct val="35000"/>
-            </a:spcAft>
-          </a:pPr>
-          <a:r>
-            <a:rPr lang="de-DE" sz="3900" kern="1200" dirty="0" smtClean="0"/>
-            <a:t>Tweets / </a:t>
-          </a:r>
-          <a:r>
-            <a:rPr lang="de-DE" sz="3900" kern="1200" dirty="0" err="1" smtClean="0"/>
-            <a:t>Retweets</a:t>
-          </a:r>
-          <a:endParaRPr lang="de-DE" sz="3900" kern="1200" dirty="0"/>
-        </a:p>
-      </dsp:txBody>
-      <dsp:txXfrm>
-        <a:off x="44549" y="3157629"/>
-        <a:ext cx="6006902" cy="823502"/>
-      </dsp:txXfrm>
-    </dsp:sp>
   </dsp:spTree>
 </dsp:drawing>
 </file>
@@ -3705,277 +3148,6 @@
       <dsp:cNvGrpSpPr/>
     </dsp:nvGrpSpPr>
     <dsp:grpSpPr/>
-    <dsp:sp modelId="{822618A0-FEEB-45CC-81A0-15FF6A91EB8A}">
-      <dsp:nvSpPr>
-        <dsp:cNvPr id="0" name=""/>
-        <dsp:cNvSpPr/>
-      </dsp:nvSpPr>
-      <dsp:spPr>
-        <a:xfrm>
-          <a:off x="457199" y="0"/>
-          <a:ext cx="5181600" cy="4064000"/>
-        </a:xfrm>
-        <a:prstGeom prst="rightArrow">
-          <a:avLst/>
-        </a:prstGeom>
-        <a:solidFill>
-          <a:schemeClr val="accent1">
-            <a:tint val="40000"/>
-            <a:hueOff val="0"/>
-            <a:satOff val="0"/>
-            <a:lumOff val="0"/>
-            <a:alphaOff val="0"/>
-          </a:schemeClr>
-        </a:solidFill>
-        <a:ln>
-          <a:noFill/>
-        </a:ln>
-        <a:effectLst/>
-      </dsp:spPr>
-      <dsp:style>
-        <a:lnRef idx="0">
-          <a:scrgbClr r="0" g="0" b="0"/>
-        </a:lnRef>
-        <a:fillRef idx="1">
-          <a:scrgbClr r="0" g="0" b="0"/>
-        </a:fillRef>
-        <a:effectRef idx="0">
-          <a:scrgbClr r="0" g="0" b="0"/>
-        </a:effectRef>
-        <a:fontRef idx="minor"/>
-      </dsp:style>
-    </dsp:sp>
-    <dsp:sp modelId="{8A3B181F-EAC8-46DE-BBF3-BDB9DE3336EF}">
-      <dsp:nvSpPr>
-        <dsp:cNvPr id="0" name=""/>
-        <dsp:cNvSpPr/>
-      </dsp:nvSpPr>
-      <dsp:spPr>
-        <a:xfrm>
-          <a:off x="3767" y="1219199"/>
-          <a:ext cx="1961126" cy="1625600"/>
-        </a:xfrm>
-        <a:prstGeom prst="roundRect">
-          <a:avLst/>
-        </a:prstGeom>
-        <a:solidFill>
-          <a:schemeClr val="accent1">
-            <a:hueOff val="0"/>
-            <a:satOff val="0"/>
-            <a:lumOff val="0"/>
-            <a:alphaOff val="0"/>
-          </a:schemeClr>
-        </a:solidFill>
-        <a:ln w="25400" cap="flat" cmpd="sng" algn="ctr">
-          <a:solidFill>
-            <a:schemeClr val="lt1">
-              <a:hueOff val="0"/>
-              <a:satOff val="0"/>
-              <a:lumOff val="0"/>
-              <a:alphaOff val="0"/>
-            </a:schemeClr>
-          </a:solidFill>
-          <a:prstDash val="solid"/>
-        </a:ln>
-        <a:effectLst/>
-      </dsp:spPr>
-      <dsp:style>
-        <a:lnRef idx="2">
-          <a:scrgbClr r="0" g="0" b="0"/>
-        </a:lnRef>
-        <a:fillRef idx="1">
-          <a:scrgbClr r="0" g="0" b="0"/>
-        </a:fillRef>
-        <a:effectRef idx="0">
-          <a:scrgbClr r="0" g="0" b="0"/>
-        </a:effectRef>
-        <a:fontRef idx="minor">
-          <a:schemeClr val="lt1"/>
-        </a:fontRef>
-      </dsp:style>
-      <dsp:txBody>
-        <a:bodyPr spcFirstLastPara="0" vert="horz" wrap="square" lIns="76200" tIns="76200" rIns="76200" bIns="76200" numCol="1" spcCol="1270" anchor="ctr" anchorCtr="0">
-          <a:noAutofit/>
-        </a:bodyPr>
-        <a:lstStyle/>
-        <a:p>
-          <a:pPr lvl="0" algn="ctr" defTabSz="889000">
-            <a:lnSpc>
-              <a:spcPct val="90000"/>
-            </a:lnSpc>
-            <a:spcBef>
-              <a:spcPct val="0"/>
-            </a:spcBef>
-            <a:spcAft>
-              <a:spcPct val="35000"/>
-            </a:spcAft>
-          </a:pPr>
-          <a:r>
-            <a:rPr lang="de-DE" sz="2000" kern="1200" dirty="0" err="1" smtClean="0"/>
-            <a:t>TwitterStream</a:t>
-          </a:r>
-          <a:endParaRPr lang="de-DE" sz="2000" kern="1200" dirty="0"/>
-        </a:p>
-      </dsp:txBody>
-      <dsp:txXfrm>
-        <a:off x="83122" y="1298554"/>
-        <a:ext cx="1802416" cy="1466890"/>
-      </dsp:txXfrm>
-    </dsp:sp>
-    <dsp:sp modelId="{F0428DC1-2320-4439-BA06-F77B96603CEF}">
-      <dsp:nvSpPr>
-        <dsp:cNvPr id="0" name=""/>
-        <dsp:cNvSpPr/>
-      </dsp:nvSpPr>
-      <dsp:spPr>
-        <a:xfrm>
-          <a:off x="2067436" y="1219199"/>
-          <a:ext cx="1961126" cy="1625600"/>
-        </a:xfrm>
-        <a:prstGeom prst="roundRect">
-          <a:avLst/>
-        </a:prstGeom>
-        <a:solidFill>
-          <a:schemeClr val="accent1">
-            <a:hueOff val="0"/>
-            <a:satOff val="0"/>
-            <a:lumOff val="0"/>
-            <a:alphaOff val="0"/>
-          </a:schemeClr>
-        </a:solidFill>
-        <a:ln w="25400" cap="flat" cmpd="sng" algn="ctr">
-          <a:solidFill>
-            <a:schemeClr val="lt1">
-              <a:hueOff val="0"/>
-              <a:satOff val="0"/>
-              <a:lumOff val="0"/>
-              <a:alphaOff val="0"/>
-            </a:schemeClr>
-          </a:solidFill>
-          <a:prstDash val="solid"/>
-        </a:ln>
-        <a:effectLst/>
-      </dsp:spPr>
-      <dsp:style>
-        <a:lnRef idx="2">
-          <a:scrgbClr r="0" g="0" b="0"/>
-        </a:lnRef>
-        <a:fillRef idx="1">
-          <a:scrgbClr r="0" g="0" b="0"/>
-        </a:fillRef>
-        <a:effectRef idx="0">
-          <a:scrgbClr r="0" g="0" b="0"/>
-        </a:effectRef>
-        <a:fontRef idx="minor">
-          <a:schemeClr val="lt1"/>
-        </a:fontRef>
-      </dsp:style>
-      <dsp:txBody>
-        <a:bodyPr spcFirstLastPara="0" vert="horz" wrap="square" lIns="76200" tIns="76200" rIns="76200" bIns="76200" numCol="1" spcCol="1270" anchor="ctr" anchorCtr="0">
-          <a:noAutofit/>
-        </a:bodyPr>
-        <a:lstStyle/>
-        <a:p>
-          <a:pPr lvl="0" algn="ctr" defTabSz="889000">
-            <a:lnSpc>
-              <a:spcPct val="90000"/>
-            </a:lnSpc>
-            <a:spcBef>
-              <a:spcPct val="0"/>
-            </a:spcBef>
-            <a:spcAft>
-              <a:spcPct val="35000"/>
-            </a:spcAft>
-          </a:pPr>
-          <a:r>
-            <a:rPr lang="de-DE" sz="2000" kern="1200" dirty="0" err="1" smtClean="0"/>
-            <a:t>Cralwler</a:t>
-          </a:r>
-          <a:endParaRPr lang="de-DE" sz="2000" kern="1200" dirty="0"/>
-        </a:p>
-      </dsp:txBody>
-      <dsp:txXfrm>
-        <a:off x="2146791" y="1298554"/>
-        <a:ext cx="1802416" cy="1466890"/>
-      </dsp:txXfrm>
-    </dsp:sp>
-    <dsp:sp modelId="{24396DDF-2494-4281-972C-EDC799D3E3E7}">
-      <dsp:nvSpPr>
-        <dsp:cNvPr id="0" name=""/>
-        <dsp:cNvSpPr/>
-      </dsp:nvSpPr>
-      <dsp:spPr>
-        <a:xfrm>
-          <a:off x="4131105" y="1219199"/>
-          <a:ext cx="1961126" cy="1625600"/>
-        </a:xfrm>
-        <a:prstGeom prst="roundRect">
-          <a:avLst/>
-        </a:prstGeom>
-        <a:solidFill>
-          <a:schemeClr val="accent1">
-            <a:hueOff val="0"/>
-            <a:satOff val="0"/>
-            <a:lumOff val="0"/>
-            <a:alphaOff val="0"/>
-          </a:schemeClr>
-        </a:solidFill>
-        <a:ln w="25400" cap="flat" cmpd="sng" algn="ctr">
-          <a:solidFill>
-            <a:schemeClr val="lt1">
-              <a:hueOff val="0"/>
-              <a:satOff val="0"/>
-              <a:lumOff val="0"/>
-              <a:alphaOff val="0"/>
-            </a:schemeClr>
-          </a:solidFill>
-          <a:prstDash val="solid"/>
-        </a:ln>
-        <a:effectLst/>
-      </dsp:spPr>
-      <dsp:style>
-        <a:lnRef idx="2">
-          <a:scrgbClr r="0" g="0" b="0"/>
-        </a:lnRef>
-        <a:fillRef idx="1">
-          <a:scrgbClr r="0" g="0" b="0"/>
-        </a:fillRef>
-        <a:effectRef idx="0">
-          <a:scrgbClr r="0" g="0" b="0"/>
-        </a:effectRef>
-        <a:fontRef idx="minor">
-          <a:schemeClr val="lt1"/>
-        </a:fontRef>
-      </dsp:style>
-      <dsp:txBody>
-        <a:bodyPr spcFirstLastPara="0" vert="horz" wrap="square" lIns="76200" tIns="76200" rIns="76200" bIns="76200" numCol="1" spcCol="1270" anchor="ctr" anchorCtr="0">
-          <a:noAutofit/>
-        </a:bodyPr>
-        <a:lstStyle/>
-        <a:p>
-          <a:pPr lvl="0" algn="ctr" defTabSz="889000">
-            <a:lnSpc>
-              <a:spcPct val="90000"/>
-            </a:lnSpc>
-            <a:spcBef>
-              <a:spcPct val="0"/>
-            </a:spcBef>
-            <a:spcAft>
-              <a:spcPct val="35000"/>
-            </a:spcAft>
-          </a:pPr>
-          <a:r>
-            <a:rPr lang="de-DE" sz="2000" kern="1200" dirty="0" smtClean="0"/>
-            <a:t>DB</a:t>
-          </a:r>
-          <a:endParaRPr lang="de-DE" sz="2000" kern="1200" dirty="0"/>
-        </a:p>
-      </dsp:txBody>
-      <dsp:txXfrm>
-        <a:off x="4210460" y="1298554"/>
-        <a:ext cx="1802416" cy="1466890"/>
-      </dsp:txXfrm>
-    </dsp:sp>
   </dsp:spTree>
 </dsp:drawing>
 </file>
@@ -4284,12 +3456,11 @@
 </file>
 
 <file path=ppt/diagrams/layout3.xml><?xml version="1.0" encoding="utf-8"?>
-<dgm:layoutDef xmlns:dgm="http://schemas.openxmlformats.org/drawingml/2006/diagram" xmlns:a="http://schemas.openxmlformats.org/drawingml/2006/main" uniqueId="urn:microsoft.com/office/officeart/2005/8/layout/hProcess9">
+<dgm:layoutDef xmlns:dgm="http://schemas.openxmlformats.org/drawingml/2006/diagram" xmlns:a="http://schemas.openxmlformats.org/drawingml/2006/main" uniqueId="urn:microsoft.com/office/officeart/2005/8/layout/hChevron3">
   <dgm:title val=""/>
   <dgm:desc val=""/>
   <dgm:catLst>
-    <dgm:cat type="process" pri="5000"/>
-    <dgm:cat type="convert" pri="13000"/>
+    <dgm:cat type="process" pri="10000"/>
   </dgm:catLst>
   <dgm:sampData useDef="1">
     <dgm:dataModel>
@@ -4332,107 +3503,226 @@
       <dgm:whole/>
     </dgm:dataModel>
   </dgm:clrData>
-  <dgm:layoutNode name="CompostProcess">
+  <dgm:layoutNode name="Name0">
     <dgm:varLst>
       <dgm:dir/>
       <dgm:resizeHandles val="exact"/>
     </dgm:varLst>
-    <dgm:alg type="composite">
-      <dgm:param type="horzAlign" val="ctr"/>
-      <dgm:param type="vertAlign" val="mid"/>
-    </dgm:alg>
+    <dgm:choose name="Name1">
+      <dgm:if name="Name2" func="var" arg="dir" op="equ" val="norm">
+        <dgm:alg type="lin"/>
+      </dgm:if>
+      <dgm:else name="Name3">
+        <dgm:alg type="lin">
+          <dgm:param type="linDir" val="fromR"/>
+        </dgm:alg>
+      </dgm:else>
+    </dgm:choose>
     <dgm:shape xmlns:r="http://schemas.openxmlformats.org/officeDocument/2006/relationships" r:blip="">
       <dgm:adjLst/>
     </dgm:shape>
     <dgm:presOf/>
-    <dgm:constrLst>
-      <dgm:constr type="w" for="ch" forName="arrow" refType="w" fact="0.85"/>
-      <dgm:constr type="h" for="ch" forName="arrow" refType="h"/>
-      <dgm:constr type="ctrX" for="ch" forName="arrow" refType="w" fact="0.5"/>
-      <dgm:constr type="ctrY" for="ch" forName="arrow" refType="h" fact="0.5"/>
-      <dgm:constr type="w" for="ch" forName="linearProcess" refType="w"/>
-      <dgm:constr type="h" for="ch" forName="linearProcess" refType="h" fact="0.4"/>
-      <dgm:constr type="ctrX" for="ch" forName="linearProcess" refType="w" fact="0.5"/>
-      <dgm:constr type="ctrY" for="ch" forName="linearProcess" refType="h" fact="0.5"/>
-    </dgm:constrLst>
-    <dgm:ruleLst/>
-    <dgm:layoutNode name="arrow" styleLbl="bgShp">
-      <dgm:alg type="sp"/>
-      <dgm:choose name="Name0">
-        <dgm:if name="Name1" func="var" arg="dir" op="equ" val="norm">
-          <dgm:shape xmlns:r="http://schemas.openxmlformats.org/officeDocument/2006/relationships" type="rightArrow" r:blip="">
-            <dgm:adjLst/>
-          </dgm:shape>
-        </dgm:if>
-        <dgm:else name="Name2">
-          <dgm:shape xmlns:r="http://schemas.openxmlformats.org/officeDocument/2006/relationships" type="leftArrow" r:blip="">
-            <dgm:adjLst/>
-          </dgm:shape>
-        </dgm:else>
-      </dgm:choose>
-      <dgm:presOf/>
-      <dgm:constrLst/>
-      <dgm:ruleLst/>
-    </dgm:layoutNode>
-    <dgm:layoutNode name="linearProcess">
-      <dgm:choose name="Name3">
-        <dgm:if name="Name4" func="var" arg="dir" op="equ" val="norm">
-          <dgm:alg type="lin"/>
-        </dgm:if>
-        <dgm:else name="Name5">
-          <dgm:alg type="lin">
-            <dgm:param type="linDir" val="fromR"/>
-          </dgm:alg>
-        </dgm:else>
-      </dgm:choose>
-      <dgm:shape xmlns:r="http://schemas.openxmlformats.org/officeDocument/2006/relationships" r:blip="">
-        <dgm:adjLst/>
-      </dgm:shape>
-      <dgm:presOf/>
-      <dgm:constrLst>
-        <dgm:constr type="userA" for="ch" ptType="node" refType="w"/>
-        <dgm:constr type="h" for="ch" ptType="node" refType="h"/>
-        <dgm:constr type="w" for="ch" ptType="node" op="equ"/>
-        <dgm:constr type="w" for="ch" forName="sibTrans" refType="w" fact="0.05"/>
-        <dgm:constr type="primFontSz" for="ch" ptType="node" op="equ" val="65"/>
-      </dgm:constrLst>
-      <dgm:ruleLst/>
-      <dgm:forEach name="Name6" axis="ch" ptType="node">
-        <dgm:layoutNode name="textNode" styleLbl="node1">
-          <dgm:varLst>
-            <dgm:bulletEnabled val="1"/>
-          </dgm:varLst>
-          <dgm:alg type="tx"/>
-          <dgm:shape xmlns:r="http://schemas.openxmlformats.org/officeDocument/2006/relationships" type="roundRect" r:blip="">
-            <dgm:adjLst/>
-          </dgm:shape>
-          <dgm:presOf axis="desOrSelf" ptType="node"/>
-          <dgm:constrLst>
-            <dgm:constr type="userA"/>
-            <dgm:constr type="w" refType="userA" fact="0.3"/>
-            <dgm:constr type="tMarg" refType="primFontSz" fact="0.3"/>
-            <dgm:constr type="bMarg" refType="primFontSz" fact="0.3"/>
-            <dgm:constr type="lMarg" refType="primFontSz" fact="0.3"/>
-            <dgm:constr type="rMarg" refType="primFontSz" fact="0.3"/>
-          </dgm:constrLst>
-          <dgm:ruleLst>
-            <dgm:rule type="w" val="NaN" fact="1" max="NaN"/>
-            <dgm:rule type="primFontSz" val="5" fact="NaN" max="NaN"/>
-          </dgm:ruleLst>
-        </dgm:layoutNode>
-        <dgm:forEach name="Name7" axis="followSib" ptType="sibTrans" cnt="1">
-          <dgm:layoutNode name="sibTrans">
-            <dgm:alg type="sp"/>
-            <dgm:shape xmlns:r="http://schemas.openxmlformats.org/officeDocument/2006/relationships" r:blip="">
-              <dgm:adjLst/>
-            </dgm:shape>
-            <dgm:presOf/>
-            <dgm:constrLst/>
-            <dgm:ruleLst/>
+    <dgm:choose name="Name4">
+      <dgm:if name="Name5" axis="root des" func="maxDepth" op="gte" val="2">
+        <dgm:constrLst>
+          <dgm:constr type="w" for="ch" forName="parAndChTx" refType="w"/>
+          <dgm:constr type="primFontSz" for="ch" ptType="node" op="equ"/>
+          <dgm:constr type="w" for="ch" forName="parAndChSpace" refType="w" refFor="ch" refForName="parAndChTx" fact="-0.2"/>
+          <dgm:constr type="w" for="ch" ptType="sibTrans" op="equ"/>
+        </dgm:constrLst>
+        <dgm:ruleLst/>
+        <dgm:forEach name="Name6" axis="ch" ptType="node">
+          <dgm:layoutNode name="parAndChTx">
+            <dgm:varLst>
+              <dgm:bulletEnabled val="1"/>
+            </dgm:varLst>
+            <dgm:alg type="tx"/>
+            <dgm:choose name="Name7">
+              <dgm:if name="Name8" func="var" arg="dir" op="equ" val="norm">
+                <dgm:choose name="Name9">
+                  <dgm:if name="Name10" axis="self" ptType="node" func="pos" op="equ" val="1">
+                    <dgm:shape xmlns:r="http://schemas.openxmlformats.org/officeDocument/2006/relationships" type="homePlate" r:blip="">
+                      <dgm:adjLst>
+                        <dgm:adj idx="1" val="0.25"/>
+                      </dgm:adjLst>
+                    </dgm:shape>
+                    <dgm:presOf axis="desOrSelf" ptType="node"/>
+                    <dgm:constrLst>
+                      <dgm:constr type="h" refType="w" op="equ" fact="0.8"/>
+                      <dgm:constr type="primFontSz" val="65"/>
+                      <dgm:constr type="tMarg" refType="primFontSz" fact="0.2"/>
+                      <dgm:constr type="bMarg" refType="primFontSz" fact="0.2"/>
+                      <dgm:constr type="lMarg" refType="w" fact="0.1"/>
+                      <dgm:constr type="rMarg" refType="w" fact="0.4"/>
+                    </dgm:constrLst>
+                  </dgm:if>
+                  <dgm:else name="Name11">
+                    <dgm:shape xmlns:r="http://schemas.openxmlformats.org/officeDocument/2006/relationships" type="chevron" r:blip="">
+                      <dgm:adjLst>
+                        <dgm:adj idx="1" val="0.25"/>
+                      </dgm:adjLst>
+                    </dgm:shape>
+                    <dgm:presOf axis="desOrSelf" ptType="node"/>
+                    <dgm:constrLst>
+                      <dgm:constr type="h" refType="w" op="equ" fact="0.8"/>
+                      <dgm:constr type="primFontSz" val="65"/>
+                      <dgm:constr type="tMarg" refType="primFontSz" fact="0.2"/>
+                      <dgm:constr type="bMarg" refType="primFontSz" fact="0.2"/>
+                      <dgm:constr type="lMarg" refType="w" fact="0.1"/>
+                      <dgm:constr type="rMarg" refType="w" fact="0.1"/>
+                    </dgm:constrLst>
+                  </dgm:else>
+                </dgm:choose>
+              </dgm:if>
+              <dgm:else name="Name12">
+                <dgm:choose name="Name13">
+                  <dgm:if name="Name14" axis="self" ptType="node" func="pos" op="equ" val="1">
+                    <dgm:shape xmlns:r="http://schemas.openxmlformats.org/officeDocument/2006/relationships" rot="180" type="homePlate" r:blip="">
+                      <dgm:adjLst>
+                        <dgm:adj idx="1" val="0.25"/>
+                      </dgm:adjLst>
+                    </dgm:shape>
+                    <dgm:presOf axis="desOrSelf" ptType="node"/>
+                    <dgm:constrLst>
+                      <dgm:constr type="h" refType="w" op="equ" fact="0.8"/>
+                      <dgm:constr type="primFontSz" val="65"/>
+                      <dgm:constr type="tMarg" refType="primFontSz" fact="0.2"/>
+                      <dgm:constr type="bMarg" refType="primFontSz" fact="0.2"/>
+                      <dgm:constr type="lMarg" refType="w" fact="0.4"/>
+                      <dgm:constr type="rMarg" refType="w" fact="0.1"/>
+                    </dgm:constrLst>
+                  </dgm:if>
+                  <dgm:else name="Name15">
+                    <dgm:shape xmlns:r="http://schemas.openxmlformats.org/officeDocument/2006/relationships" rot="180" type="chevron" r:blip="">
+                      <dgm:adjLst>
+                        <dgm:adj idx="1" val="0.25"/>
+                      </dgm:adjLst>
+                    </dgm:shape>
+                    <dgm:presOf axis="desOrSelf" ptType="node"/>
+                    <dgm:constrLst>
+                      <dgm:constr type="h" refType="w" op="equ" fact="0.8"/>
+                      <dgm:constr type="primFontSz" val="65"/>
+                      <dgm:constr type="tMarg" refType="primFontSz" fact="0.2"/>
+                      <dgm:constr type="bMarg" refType="primFontSz" fact="0.2"/>
+                      <dgm:constr type="lMarg" refType="w" fact="0.1"/>
+                      <dgm:constr type="rMarg" refType="w" fact="0.1"/>
+                    </dgm:constrLst>
+                  </dgm:else>
+                </dgm:choose>
+              </dgm:else>
+            </dgm:choose>
+            <dgm:ruleLst>
+              <dgm:rule type="primFontSz" val="5" fact="NaN" max="NaN"/>
+            </dgm:ruleLst>
           </dgm:layoutNode>
+          <dgm:forEach name="Name16" axis="followSib" ptType="sibTrans" cnt="1">
+            <dgm:layoutNode name="parAndChSpace">
+              <dgm:alg type="sp"/>
+              <dgm:shape xmlns:r="http://schemas.openxmlformats.org/officeDocument/2006/relationships" r:blip="">
+                <dgm:adjLst/>
+              </dgm:shape>
+              <dgm:presOf/>
+              <dgm:constrLst/>
+              <dgm:ruleLst/>
+            </dgm:layoutNode>
+          </dgm:forEach>
         </dgm:forEach>
-      </dgm:forEach>
-    </dgm:layoutNode>
+      </dgm:if>
+      <dgm:else name="Name17">
+        <dgm:constrLst>
+          <dgm:constr type="w" for="ch" forName="parTxOnly" refType="w"/>
+          <dgm:constr type="primFontSz" for="ch" ptType="node" op="equ"/>
+          <dgm:constr type="w" for="ch" forName="parSpace" refType="w" refFor="ch" refForName="parTxOnly" fact="-0.2"/>
+          <dgm:constr type="w" for="ch" ptType="sibTrans" op="equ"/>
+        </dgm:constrLst>
+        <dgm:ruleLst/>
+        <dgm:forEach name="Name18" axis="ch" ptType="node">
+          <dgm:layoutNode name="parTxOnly">
+            <dgm:varLst>
+              <dgm:bulletEnabled val="1"/>
+            </dgm:varLst>
+            <dgm:alg type="tx"/>
+            <dgm:presOf axis="desOrSelf" ptType="node"/>
+            <dgm:choose name="Name19">
+              <dgm:if name="Name20" func="var" arg="dir" op="equ" val="norm">
+                <dgm:choose name="Name21">
+                  <dgm:if name="Name22" axis="self" ptType="node" func="pos" op="equ" val="1">
+                    <dgm:shape xmlns:r="http://schemas.openxmlformats.org/officeDocument/2006/relationships" type="homePlate" r:blip="">
+                      <dgm:adjLst/>
+                    </dgm:shape>
+                    <dgm:constrLst>
+                      <dgm:constr type="h" refType="w" op="equ" fact="0.4"/>
+                      <dgm:constr type="primFontSz" val="65"/>
+                      <dgm:constr type="tMarg" refType="primFontSz" fact="0.21"/>
+                      <dgm:constr type="bMarg" refType="primFontSz" fact="0.21"/>
+                      <dgm:constr type="lMarg" refType="primFontSz" fact="0.42"/>
+                      <dgm:constr type="rMarg" refType="primFontSz" fact="0.105"/>
+                    </dgm:constrLst>
+                  </dgm:if>
+                  <dgm:else name="Name23">
+                    <dgm:shape xmlns:r="http://schemas.openxmlformats.org/officeDocument/2006/relationships" type="chevron" r:blip="">
+                      <dgm:adjLst/>
+                    </dgm:shape>
+                    <dgm:constrLst>
+                      <dgm:constr type="h" refType="w" op="equ" fact="0.4"/>
+                      <dgm:constr type="primFontSz" val="65"/>
+                      <dgm:constr type="tMarg" refType="primFontSz" fact="0.21"/>
+                      <dgm:constr type="bMarg" refType="primFontSz" fact="0.21"/>
+                      <dgm:constr type="lMarg" refType="primFontSz" fact="0.315"/>
+                      <dgm:constr type="rMarg" refType="primFontSz" fact="0.105"/>
+                    </dgm:constrLst>
+                  </dgm:else>
+                </dgm:choose>
+              </dgm:if>
+              <dgm:else name="Name24">
+                <dgm:choose name="Name25">
+                  <dgm:if name="Name26" axis="self" ptType="node" func="pos" op="equ" val="1">
+                    <dgm:shape xmlns:r="http://schemas.openxmlformats.org/officeDocument/2006/relationships" rot="180" type="homePlate" r:blip="">
+                      <dgm:adjLst/>
+                    </dgm:shape>
+                    <dgm:constrLst>
+                      <dgm:constr type="h" refType="w" op="equ" fact="0.4"/>
+                      <dgm:constr type="primFontSz" val="65"/>
+                      <dgm:constr type="tMarg" refType="primFontSz" fact="0.21"/>
+                      <dgm:constr type="bMarg" refType="primFontSz" fact="0.21"/>
+                      <dgm:constr type="lMarg" refType="primFontSz" fact="0.105"/>
+                      <dgm:constr type="rMarg" refType="primFontSz" fact="0.42"/>
+                    </dgm:constrLst>
+                  </dgm:if>
+                  <dgm:else name="Name27">
+                    <dgm:shape xmlns:r="http://schemas.openxmlformats.org/officeDocument/2006/relationships" rot="180" type="chevron" r:blip="">
+                      <dgm:adjLst/>
+                    </dgm:shape>
+                    <dgm:constrLst>
+                      <dgm:constr type="h" refType="w" op="equ" fact="0.4"/>
+                      <dgm:constr type="primFontSz" val="65"/>
+                      <dgm:constr type="tMarg" refType="primFontSz" fact="0.21"/>
+                      <dgm:constr type="bMarg" refType="primFontSz" fact="0.21"/>
+                      <dgm:constr type="lMarg" refType="primFontSz" fact="0.105"/>
+                      <dgm:constr type="rMarg" refType="primFontSz" fact="0.315"/>
+                    </dgm:constrLst>
+                  </dgm:else>
+                </dgm:choose>
+              </dgm:else>
+            </dgm:choose>
+            <dgm:ruleLst>
+              <dgm:rule type="primFontSz" val="5" fact="NaN" max="NaN"/>
+            </dgm:ruleLst>
+          </dgm:layoutNode>
+          <dgm:forEach name="Name28" axis="followSib" ptType="sibTrans" cnt="1">
+            <dgm:layoutNode name="parSpace">
+              <dgm:alg type="sp"/>
+              <dgm:shape xmlns:r="http://schemas.openxmlformats.org/officeDocument/2006/relationships" r:blip="">
+                <dgm:adjLst/>
+              </dgm:shape>
+              <dgm:presOf/>
+              <dgm:constrLst/>
+              <dgm:ruleLst/>
+            </dgm:layoutNode>
+          </dgm:forEach>
+        </dgm:forEach>
+      </dgm:else>
+    </dgm:choose>
   </dgm:layoutNode>
 </dgm:layoutDef>
 </file>
@@ -8373,7 +7663,7 @@
               <a:pPr>
                 <a:defRPr/>
               </a:pPr>
-              <a:t>3</a:t>
+              <a:t>2</a:t>
             </a:fld>
             <a:endParaRPr lang="de-DE"/>
           </a:p>
@@ -8444,6 +7734,18 @@
               <a:rPr lang="de-DE" dirty="0" err="1" smtClean="0"/>
               <a:t>WebLokalisierungsdienst</a:t>
             </a:r>
+            <a:r>
+              <a:rPr lang="de-DE" dirty="0" smtClean="0"/>
+              <a:t> (Peter </a:t>
+            </a:r>
+            <a:r>
+              <a:rPr lang="de-DE" dirty="0" err="1" smtClean="0"/>
+              <a:t>Bolch</a:t>
+            </a:r>
+            <a:r>
+              <a:rPr lang="de-DE" smtClean="0"/>
+              <a:t>)</a:t>
+            </a:r>
             <a:endParaRPr lang="de-DE" dirty="0"/>
           </a:p>
         </p:txBody>
@@ -8493,7 +7795,7 @@
               <a:pPr>
                 <a:defRPr/>
               </a:pPr>
-              <a:t>4</a:t>
+              <a:t>3</a:t>
             </a:fld>
             <a:endParaRPr lang="de-DE"/>
           </a:p>
@@ -8558,7 +7860,15 @@
           <a:p>
             <a:r>
               <a:rPr lang="de-DE" dirty="0" smtClean="0"/>
-              <a:t>MySQL Paket</a:t>
+              <a:t>Tweets/</a:t>
+            </a:r>
+            <a:r>
+              <a:rPr lang="de-DE" dirty="0" err="1" smtClean="0"/>
+              <a:t>Retweets</a:t>
+            </a:r>
+            <a:r>
+              <a:rPr lang="de-DE" dirty="0" smtClean="0"/>
+              <a:t> pro Tag</a:t>
             </a:r>
             <a:endParaRPr lang="de-DE" dirty="0"/>
           </a:p>
@@ -8609,7 +7919,7 @@
               <a:pPr>
                 <a:defRPr/>
               </a:pPr>
-              <a:t>6</a:t>
+              <a:t>5</a:t>
             </a:fld>
             <a:endParaRPr lang="de-DE"/>
           </a:p>
@@ -8672,10 +7982,6 @@
           <a:bodyPr/>
           <a:lstStyle/>
           <a:p>
-            <a:r>
-              <a:rPr lang="de-DE" dirty="0" smtClean="0"/>
-              <a:t>MySQL Paket</a:t>
-            </a:r>
             <a:endParaRPr lang="de-DE" dirty="0"/>
           </a:p>
         </p:txBody>
@@ -8725,7 +8031,7 @@
               <a:pPr>
                 <a:defRPr/>
               </a:pPr>
-              <a:t>7</a:t>
+              <a:t>6</a:t>
             </a:fld>
             <a:endParaRPr lang="de-DE"/>
           </a:p>
@@ -8849,7 +8155,7 @@
               <a:pPr>
                 <a:defRPr/>
               </a:pPr>
-              <a:t>11</a:t>
+              <a:t>10</a:t>
             </a:fld>
             <a:endParaRPr lang="de-DE"/>
           </a:p>
@@ -8985,7 +8291,7 @@
               <a:pPr>
                 <a:defRPr/>
               </a:pPr>
-              <a:t>13</a:t>
+              <a:t>12</a:t>
             </a:fld>
             <a:endParaRPr lang="de-DE"/>
           </a:p>
@@ -9101,7 +8407,7 @@
               <a:pPr>
                 <a:defRPr/>
               </a:pPr>
-              <a:t>14</a:t>
+              <a:t>13</a:t>
             </a:fld>
             <a:endParaRPr lang="de-DE"/>
           </a:p>
@@ -9245,7 +8551,7 @@
               <a:pPr>
                 <a:defRPr/>
               </a:pPr>
-              <a:t>15</a:t>
+              <a:t>14</a:t>
             </a:fld>
             <a:endParaRPr lang="de-DE"/>
           </a:p>
@@ -9712,7 +9018,7 @@
             <a:fld id="{80E101DA-C805-49D6-936E-EF17408DE37B}" type="datetime1">
               <a:rPr lang="de-DE" smtClean="0"/>
               <a:pPr/>
-              <a:t>15.03.2015</a:t>
+              <a:t>16.03.2015</a:t>
             </a:fld>
             <a:endParaRPr lang="de-DE" dirty="0"/>
           </a:p>
@@ -9892,7 +9198,7 @@
             <a:fld id="{2B68D019-5134-4866-8BCC-6AD2983F956C}" type="datetime1">
               <a:rPr lang="de-DE" smtClean="0"/>
               <a:pPr/>
-              <a:t>15.03.2015</a:t>
+              <a:t>16.03.2015</a:t>
             </a:fld>
             <a:endParaRPr lang="de-DE" dirty="0"/>
           </a:p>
@@ -10588,7 +9894,7 @@
             <a:fld id="{503864FC-C1F6-4F60-90E2-4C82285A7CB6}" type="datetime1">
               <a:rPr lang="de-DE" smtClean="0"/>
               <a:pPr/>
-              <a:t>15.03.2015</a:t>
+              <a:t>16.03.2015</a:t>
             </a:fld>
             <a:endParaRPr lang="de-DE" dirty="0"/>
           </a:p>
@@ -11015,7 +10321,7 @@
             <a:fld id="{DFFFF499-D2C2-429B-A38D-874884AC2B44}" type="datetime1">
               <a:rPr lang="de-DE" smtClean="0"/>
               <a:pPr/>
-              <a:t>15.03.2015</a:t>
+              <a:t>16.03.2015</a:t>
             </a:fld>
             <a:endParaRPr lang="de-DE" dirty="0"/>
           </a:p>
@@ -11133,7 +10439,7 @@
             <a:fld id="{92EEC2FF-F6B1-4953-8BD6-DF423CDA3B5D}" type="datetime1">
               <a:rPr lang="de-DE" smtClean="0"/>
               <a:pPr/>
-              <a:t>15.03.2015</a:t>
+              <a:t>16.03.2015</a:t>
             </a:fld>
             <a:endParaRPr lang="de-DE" dirty="0"/>
           </a:p>
@@ -11228,7 +10534,7 @@
             <a:fld id="{CC0FF657-D1DB-4306-82A3-A2011C94EF85}" type="datetime1">
               <a:rPr lang="de-DE" smtClean="0"/>
               <a:pPr/>
-              <a:t>15.03.2015</a:t>
+              <a:t>16.03.2015</a:t>
             </a:fld>
             <a:endParaRPr lang="de-DE" dirty="0"/>
           </a:p>
@@ -11505,7 +10811,7 @@
             <a:fld id="{7B39ADCC-593E-41F1-8EDC-3499514C881E}" type="datetime1">
               <a:rPr lang="de-DE" smtClean="0"/>
               <a:pPr/>
-              <a:t>15.03.2015</a:t>
+              <a:t>16.03.2015</a:t>
             </a:fld>
             <a:endParaRPr lang="de-DE" dirty="0"/>
           </a:p>
@@ -11762,7 +11068,7 @@
             <a:fld id="{2517161F-0686-4A32-B5C2-6110D54CBF61}" type="datetime1">
               <a:rPr lang="de-DE" smtClean="0"/>
               <a:pPr/>
-              <a:t>15.03.2015</a:t>
+              <a:t>16.03.2015</a:t>
             </a:fld>
             <a:endParaRPr lang="de-DE" dirty="0"/>
           </a:p>
@@ -12173,7 +11479,7 @@
             <a:fld id="{C01FFB54-A4C6-43F5-85F0-3FD9312F6439}" type="datetime1">
               <a:rPr lang="de-DE" smtClean="0"/>
               <a:pPr/>
-              <a:t>15.03.2015</a:t>
+              <a:t>16.03.2015</a:t>
             </a:fld>
             <a:endParaRPr lang="de-DE" dirty="0"/>
           </a:p>
@@ -12791,278 +12097,6 @@
           <a:chExt cx="0" cy="0"/>
         </a:xfrm>
       </p:grpSpPr>
-      <p:pic>
-        <p:nvPicPr>
-          <p:cNvPr id="10" name="Grafik 9"/>
-          <p:cNvPicPr>
-            <a:picLocks noChangeAspect="1"/>
-          </p:cNvPicPr>
-          <p:nvPr/>
-        </p:nvPicPr>
-        <p:blipFill rotWithShape="1">
-          <a:blip r:embed="rId2" cstate="print">
-            <a:extLst>
-              <a:ext uri="{28A0092B-C50C-407E-A947-70E740481C1C}">
-                <a14:useLocalDpi xmlns:a14="http://schemas.microsoft.com/office/drawing/2010/main" val="0"/>
-              </a:ext>
-            </a:extLst>
-          </a:blip>
-          <a:srcRect l="21544" t="23529" r="48191" b="50000"/>
-          <a:stretch/>
-        </p:blipFill>
-        <p:spPr>
-          <a:xfrm>
-            <a:off x="1115616" y="1628800"/>
-            <a:ext cx="7272808" cy="4620372"/>
-          </a:xfrm>
-          <a:prstGeom prst="rect">
-            <a:avLst/>
-          </a:prstGeom>
-        </p:spPr>
-      </p:pic>
-      <p:sp>
-        <p:nvSpPr>
-          <p:cNvPr id="2" name="Titel 1"/>
-          <p:cNvSpPr>
-            <a:spLocks noGrp="1"/>
-          </p:cNvSpPr>
-          <p:nvPr>
-            <p:ph type="title"/>
-          </p:nvPr>
-        </p:nvSpPr>
-        <p:spPr/>
-        <p:txBody>
-          <a:bodyPr/>
-          <a:lstStyle/>
-          <a:p>
-            <a:r>
-              <a:rPr lang="de-DE" dirty="0" smtClean="0"/>
-              <a:t>2. Entwurf (Crawler)</a:t>
-            </a:r>
-            <a:endParaRPr lang="de-DE" dirty="0"/>
-          </a:p>
-        </p:txBody>
-      </p:sp>
-      <p:sp>
-        <p:nvSpPr>
-          <p:cNvPr id="21" name="Textfeld 20"/>
-          <p:cNvSpPr txBox="1"/>
-          <p:nvPr/>
-        </p:nvSpPr>
-        <p:spPr>
-          <a:xfrm>
-            <a:off x="6865632" y="1124744"/>
-            <a:ext cx="1306768" cy="292388"/>
-          </a:xfrm>
-          <a:prstGeom prst="rect">
-            <a:avLst/>
-          </a:prstGeom>
-          <a:solidFill>
-            <a:srgbClr val="FFFFFF"/>
-          </a:solidFill>
-          <a:ln w="12700">
-            <a:solidFill>
-              <a:schemeClr val="tx1"/>
-            </a:solidFill>
-          </a:ln>
-        </p:spPr>
-        <p:txBody>
-          <a:bodyPr wrap="none" rtlCol="0">
-            <a:spAutoFit/>
-          </a:bodyPr>
-          <a:lstStyle/>
-          <a:p>
-            <a:r>
-              <a:rPr lang="de-DE" sz="1300" u="sng" dirty="0" err="1" smtClean="0"/>
-              <a:t>dbc:DBCrawler</a:t>
-            </a:r>
-            <a:endParaRPr lang="de-DE" sz="1300" u="sng" dirty="0"/>
-          </a:p>
-        </p:txBody>
-      </p:sp>
-      <p:sp>
-        <p:nvSpPr>
-          <p:cNvPr id="22" name="Textfeld 21"/>
-          <p:cNvSpPr txBox="1"/>
-          <p:nvPr/>
-        </p:nvSpPr>
-        <p:spPr>
-          <a:xfrm>
-            <a:off x="5502758" y="1124744"/>
-            <a:ext cx="825867" cy="292388"/>
-          </a:xfrm>
-          <a:prstGeom prst="rect">
-            <a:avLst/>
-          </a:prstGeom>
-          <a:solidFill>
-            <a:srgbClr val="FFFFFF"/>
-          </a:solidFill>
-          <a:ln w="12700">
-            <a:solidFill>
-              <a:schemeClr val="tx1"/>
-            </a:solidFill>
-          </a:ln>
-        </p:spPr>
-        <p:txBody>
-          <a:bodyPr wrap="none" rtlCol="0">
-            <a:spAutoFit/>
-          </a:bodyPr>
-          <a:lstStyle/>
-          <a:p>
-            <a:r>
-              <a:rPr lang="de-DE" sz="1300" u="sng" dirty="0" smtClean="0"/>
-              <a:t>l:Locator</a:t>
-            </a:r>
-            <a:endParaRPr lang="de-DE" sz="1300" u="sng" dirty="0"/>
-          </a:p>
-        </p:txBody>
-      </p:sp>
-      <p:sp>
-        <p:nvSpPr>
-          <p:cNvPr id="25" name="Textfeld 24"/>
-          <p:cNvSpPr txBox="1"/>
-          <p:nvPr/>
-        </p:nvSpPr>
-        <p:spPr>
-          <a:xfrm>
-            <a:off x="2867718" y="1124744"/>
-            <a:ext cx="1957587" cy="292388"/>
-          </a:xfrm>
-          <a:prstGeom prst="rect">
-            <a:avLst/>
-          </a:prstGeom>
-          <a:solidFill>
-            <a:srgbClr val="FFFFFF"/>
-          </a:solidFill>
-          <a:ln w="12700">
-            <a:solidFill>
-              <a:schemeClr val="tx1"/>
-            </a:solidFill>
-          </a:ln>
-        </p:spPr>
-        <p:txBody>
-          <a:bodyPr wrap="none" rtlCol="0">
-            <a:spAutoFit/>
-          </a:bodyPr>
-          <a:lstStyle/>
-          <a:p>
-            <a:r>
-              <a:rPr lang="de-DE" sz="1300" u="sng" dirty="0" err="1" smtClean="0"/>
-              <a:t>worker:StatusProcessor</a:t>
-            </a:r>
-            <a:endParaRPr lang="de-DE" sz="1300" u="sng" dirty="0"/>
-          </a:p>
-        </p:txBody>
-      </p:sp>
-      <p:sp>
-        <p:nvSpPr>
-          <p:cNvPr id="9" name="Rectangle 12"/>
-          <p:cNvSpPr>
-            <a:spLocks noGrp="1" noChangeArrowheads="1"/>
-          </p:cNvSpPr>
-          <p:nvPr>
-            <p:ph type="ftr" sz="quarter" idx="10"/>
-          </p:nvPr>
-        </p:nvSpPr>
-        <p:spPr>
-          <a:xfrm>
-            <a:off x="611560" y="6443637"/>
-            <a:ext cx="7848871" cy="360363"/>
-          </a:xfrm>
-          <a:ln/>
-        </p:spPr>
-        <p:txBody>
-          <a:bodyPr/>
-          <a:lstStyle>
-            <a:lvl1pPr>
-              <a:defRPr sz="1000">
-                <a:solidFill>
-                  <a:schemeClr val="tx1"/>
-                </a:solidFill>
-                <a:latin typeface="Calibri" panose="020F0502020204030204" pitchFamily="34" charset="0"/>
-              </a:defRPr>
-            </a:lvl1pPr>
-          </a:lstStyle>
-          <a:p>
-            <a:pPr>
-              <a:defRPr/>
-            </a:pPr>
-            <a:r>
-              <a:rPr lang="de-DE" dirty="0" smtClean="0"/>
-              <a:t>Praxis der Softwareentwicklung: </a:t>
-            </a:r>
-            <a:r>
-              <a:rPr lang="de-DE" dirty="0" err="1" smtClean="0"/>
-              <a:t>Visualizing</a:t>
-            </a:r>
-            <a:r>
-              <a:rPr lang="de-DE" dirty="0" smtClean="0"/>
-              <a:t> Trends. Was verrät uns Twitter?</a:t>
-            </a:r>
-            <a:br>
-              <a:rPr lang="de-DE" dirty="0" smtClean="0"/>
-            </a:br>
-            <a:r>
-              <a:rPr lang="de-DE" dirty="0" smtClean="0"/>
-              <a:t>Aufgabenstellung               </a:t>
-            </a:r>
-            <a:r>
-              <a:rPr lang="de-DE" b="1" dirty="0" smtClean="0"/>
-              <a:t>Entwurf</a:t>
-            </a:r>
-            <a:r>
-              <a:rPr lang="de-DE" dirty="0" smtClean="0"/>
-              <a:t>		Implementierung		Validierung		Fazit</a:t>
-            </a:r>
-            <a:endParaRPr lang="de-DE" dirty="0"/>
-          </a:p>
-        </p:txBody>
-      </p:sp>
-    </p:spTree>
-    <p:extLst>
-      <p:ext uri="{BB962C8B-B14F-4D97-AF65-F5344CB8AC3E}">
-        <p14:creationId xmlns:p14="http://schemas.microsoft.com/office/powerpoint/2010/main" val="3591635622"/>
-      </p:ext>
-    </p:extLst>
-  </p:cSld>
-  <p:clrMapOvr>
-    <a:masterClrMapping/>
-  </p:clrMapOvr>
-  <mc:AlternateContent xmlns:mc="http://schemas.openxmlformats.org/markup-compatibility/2006" xmlns:p14="http://schemas.microsoft.com/office/powerpoint/2010/main">
-    <mc:Choice Requires="p14">
-      <p:transition p14:dur="0"/>
-    </mc:Choice>
-    <mc:Fallback xmlns="">
-      <p:transition/>
-    </mc:Fallback>
-  </mc:AlternateContent>
-  <p:timing>
-    <p:tnLst>
-      <p:par>
-        <p:cTn id="1" dur="indefinite" restart="never" nodeType="tmRoot"/>
-      </p:par>
-    </p:tnLst>
-  </p:timing>
-</p:sld>
-</file>
-
-<file path=ppt/slides/slide11.xml><?xml version="1.0" encoding="utf-8"?>
-<p:sld xmlns:a="http://schemas.openxmlformats.org/drawingml/2006/main" xmlns:r="http://schemas.openxmlformats.org/officeDocument/2006/relationships" xmlns:p="http://schemas.openxmlformats.org/presentationml/2006/main">
-  <p:cSld>
-    <p:spTree>
-      <p:nvGrpSpPr>
-        <p:cNvPr id="1" name=""/>
-        <p:cNvGrpSpPr/>
-        <p:nvPr/>
-      </p:nvGrpSpPr>
-      <p:grpSpPr>
-        <a:xfrm>
-          <a:off x="0" y="0"/>
-          <a:ext cx="0" cy="0"/>
-          <a:chOff x="0" y="0"/>
-          <a:chExt cx="0" cy="0"/>
-        </a:xfrm>
-      </p:grpSpPr>
       <p:sp>
         <p:nvSpPr>
           <p:cNvPr id="2" name="Titel 1"/>
@@ -13200,7 +12234,7 @@
 </p:sld>
 </file>
 
-<file path=ppt/slides/slide12.xml><?xml version="1.0" encoding="utf-8"?>
+<file path=ppt/slides/slide11.xml><?xml version="1.0" encoding="utf-8"?>
 <p:sld xmlns:a="http://schemas.openxmlformats.org/drawingml/2006/main" xmlns:r="http://schemas.openxmlformats.org/officeDocument/2006/relationships" xmlns:p="http://schemas.openxmlformats.org/presentationml/2006/main">
   <p:cSld>
     <p:spTree>
@@ -13911,7 +12945,7 @@
 </p:sld>
 </file>
 
-<file path=ppt/slides/slide13.xml><?xml version="1.0" encoding="utf-8"?>
+<file path=ppt/slides/slide12.xml><?xml version="1.0" encoding="utf-8"?>
 <p:sld xmlns:a="http://schemas.openxmlformats.org/drawingml/2006/main" xmlns:r="http://schemas.openxmlformats.org/officeDocument/2006/relationships" xmlns:p="http://schemas.openxmlformats.org/presentationml/2006/main">
   <p:cSld>
     <p:spTree>
@@ -14108,7 +13142,7 @@
 </p:sld>
 </file>
 
-<file path=ppt/slides/slide14.xml><?xml version="1.0" encoding="utf-8"?>
+<file path=ppt/slides/slide13.xml><?xml version="1.0" encoding="utf-8"?>
 <p:sld xmlns:a="http://schemas.openxmlformats.org/drawingml/2006/main" xmlns:r="http://schemas.openxmlformats.org/officeDocument/2006/relationships" xmlns:p="http://schemas.openxmlformats.org/presentationml/2006/main">
   <p:cSld>
     <p:spTree>
@@ -14352,7 +13386,7 @@
 </p:sld>
 </file>
 
-<file path=ppt/slides/slide15.xml><?xml version="1.0" encoding="utf-8"?>
+<file path=ppt/slides/slide14.xml><?xml version="1.0" encoding="utf-8"?>
 <p:sld xmlns:a="http://schemas.openxmlformats.org/drawingml/2006/main" xmlns:r="http://schemas.openxmlformats.org/officeDocument/2006/relationships" xmlns:p="http://schemas.openxmlformats.org/presentationml/2006/main">
   <p:cSld>
     <p:spTree>
@@ -15535,7 +14569,7 @@
 </p:sld>
 </file>
 
-<file path=ppt/slides/slide16.xml><?xml version="1.0" encoding="utf-8"?>
+<file path=ppt/slides/slide15.xml><?xml version="1.0" encoding="utf-8"?>
 <p:sld xmlns:a="http://schemas.openxmlformats.org/drawingml/2006/main" xmlns:r="http://schemas.openxmlformats.org/officeDocument/2006/relationships" xmlns:p="http://schemas.openxmlformats.org/presentationml/2006/main">
   <p:cSld>
     <p:spTree>
@@ -15677,459 +14711,6 @@
 </file>
 
 <file path=ppt/slides/slide2.xml><?xml version="1.0" encoding="utf-8"?>
-<p:sld xmlns:a="http://schemas.openxmlformats.org/drawingml/2006/main" xmlns:r="http://schemas.openxmlformats.org/officeDocument/2006/relationships" xmlns:p="http://schemas.openxmlformats.org/presentationml/2006/main">
-  <p:cSld>
-    <p:spTree>
-      <p:nvGrpSpPr>
-        <p:cNvPr id="1" name=""/>
-        <p:cNvGrpSpPr/>
-        <p:nvPr/>
-      </p:nvGrpSpPr>
-      <p:grpSpPr>
-        <a:xfrm>
-          <a:off x="0" y="0"/>
-          <a:ext cx="0" cy="0"/>
-          <a:chOff x="0" y="0"/>
-          <a:chExt cx="0" cy="0"/>
-        </a:xfrm>
-      </p:grpSpPr>
-      <p:sp>
-        <p:nvSpPr>
-          <p:cNvPr id="2" name="Titel 1"/>
-          <p:cNvSpPr>
-            <a:spLocks noGrp="1"/>
-          </p:cNvSpPr>
-          <p:nvPr>
-            <p:ph type="title"/>
-          </p:nvPr>
-        </p:nvSpPr>
-        <p:spPr/>
-        <p:txBody>
-          <a:bodyPr/>
-          <a:lstStyle/>
-          <a:p>
-            <a:r>
-              <a:rPr lang="de-DE" dirty="0" smtClean="0"/>
-              <a:t>Gliederung</a:t>
-            </a:r>
-            <a:endParaRPr lang="de-DE" dirty="0"/>
-          </a:p>
-        </p:txBody>
-      </p:sp>
-      <p:sp>
-        <p:nvSpPr>
-          <p:cNvPr id="3" name="Inhaltsplatzhalter 2"/>
-          <p:cNvSpPr>
-            <a:spLocks noGrp="1"/>
-          </p:cNvSpPr>
-          <p:nvPr>
-            <p:ph idx="1"/>
-          </p:nvPr>
-        </p:nvSpPr>
-        <p:spPr>
-          <a:xfrm>
-            <a:off x="607888" y="1415058"/>
-            <a:ext cx="8356600" cy="4894262"/>
-          </a:xfrm>
-        </p:spPr>
-        <p:txBody>
-          <a:bodyPr/>
-          <a:lstStyle/>
-          <a:p>
-            <a:pPr marL="457200" indent="-457200">
-              <a:buFont typeface="+mj-lt"/>
-              <a:buAutoNum type="arabicPeriod"/>
-            </a:pPr>
-            <a:r>
-              <a:rPr lang="de-DE" sz="2600" dirty="0" smtClean="0"/>
-              <a:t>Aufgabenstellung</a:t>
-            </a:r>
-          </a:p>
-          <a:p>
-            <a:pPr marL="457200" indent="-457200">
-              <a:buFont typeface="+mj-lt"/>
-              <a:buAutoNum type="arabicPeriod"/>
-            </a:pPr>
-            <a:r>
-              <a:rPr lang="de-DE" sz="2600" dirty="0" smtClean="0"/>
-              <a:t>Entwurf</a:t>
-            </a:r>
-          </a:p>
-          <a:p>
-            <a:pPr marL="457200" indent="-457200">
-              <a:buFont typeface="+mj-lt"/>
-              <a:buAutoNum type="arabicPeriod"/>
-            </a:pPr>
-            <a:r>
-              <a:rPr lang="de-DE" sz="2600" dirty="0" smtClean="0"/>
-              <a:t>Implementierung</a:t>
-            </a:r>
-          </a:p>
-          <a:p>
-            <a:pPr marL="457200" indent="-457200">
-              <a:buFont typeface="+mj-lt"/>
-              <a:buAutoNum type="arabicPeriod"/>
-            </a:pPr>
-            <a:r>
-              <a:rPr lang="de-DE" sz="2600" dirty="0" smtClean="0"/>
-              <a:t>Validierung</a:t>
-            </a:r>
-          </a:p>
-          <a:p>
-            <a:pPr marL="457200" indent="-457200">
-              <a:buFont typeface="+mj-lt"/>
-              <a:buAutoNum type="arabicPeriod"/>
-            </a:pPr>
-            <a:r>
-              <a:rPr lang="de-DE" sz="2600" dirty="0" smtClean="0"/>
-              <a:t>Fazit</a:t>
-            </a:r>
-          </a:p>
-        </p:txBody>
-      </p:sp>
-      <p:sp>
-        <p:nvSpPr>
-          <p:cNvPr id="6" name="Rectangle 12"/>
-          <p:cNvSpPr>
-            <a:spLocks noGrp="1" noChangeArrowheads="1"/>
-          </p:cNvSpPr>
-          <p:nvPr>
-            <p:ph type="ftr" sz="quarter" idx="10"/>
-          </p:nvPr>
-        </p:nvSpPr>
-        <p:spPr>
-          <a:xfrm>
-            <a:off x="611560" y="6443637"/>
-            <a:ext cx="7848871" cy="360363"/>
-          </a:xfrm>
-          <a:ln/>
-        </p:spPr>
-        <p:txBody>
-          <a:bodyPr/>
-          <a:lstStyle>
-            <a:lvl1pPr>
-              <a:defRPr sz="1000">
-                <a:solidFill>
-                  <a:schemeClr val="tx1"/>
-                </a:solidFill>
-                <a:latin typeface="Calibri" panose="020F0502020204030204" pitchFamily="34" charset="0"/>
-              </a:defRPr>
-            </a:lvl1pPr>
-          </a:lstStyle>
-          <a:p>
-            <a:pPr>
-              <a:defRPr/>
-            </a:pPr>
-            <a:r>
-              <a:rPr lang="de-DE" dirty="0" smtClean="0"/>
-              <a:t>Praxis der Softwareentwicklung: </a:t>
-            </a:r>
-            <a:r>
-              <a:rPr lang="de-DE" dirty="0" err="1" smtClean="0"/>
-              <a:t>Visualizing</a:t>
-            </a:r>
-            <a:r>
-              <a:rPr lang="de-DE" dirty="0" smtClean="0"/>
-              <a:t> Trends. Was verrät uns Twitter?</a:t>
-            </a:r>
-            <a:br>
-              <a:rPr lang="de-DE" dirty="0" smtClean="0"/>
-            </a:br>
-            <a:r>
-              <a:rPr lang="de-DE" dirty="0" smtClean="0"/>
-              <a:t>Aufgabenstellung               Entwurf		Implementierung		Validierung		Fazit</a:t>
-            </a:r>
-            <a:endParaRPr lang="de-DE" dirty="0"/>
-          </a:p>
-        </p:txBody>
-      </p:sp>
-    </p:spTree>
-  </p:cSld>
-  <p:clrMapOvr>
-    <a:masterClrMapping/>
-  </p:clrMapOvr>
-  <p:timing>
-    <p:tnLst>
-      <p:par>
-        <p:cTn id="1" dur="indefinite" restart="never" nodeType="tmRoot">
-          <p:childTnLst>
-            <p:seq concurrent="1" nextAc="seek">
-              <p:cTn id="2" dur="indefinite" nodeType="mainSeq">
-                <p:childTnLst>
-                  <p:par>
-                    <p:cTn id="3" fill="hold">
-                      <p:stCondLst>
-                        <p:cond delay="indefinite"/>
-                        <p:cond evt="onBegin" delay="0">
-                          <p:tn val="2"/>
-                        </p:cond>
-                      </p:stCondLst>
-                      <p:childTnLst>
-                        <p:par>
-                          <p:cTn id="4" fill="hold">
-                            <p:stCondLst>
-                              <p:cond delay="0"/>
-                            </p:stCondLst>
-                            <p:childTnLst>
-                              <p:par>
-                                <p:cTn id="5" presetID="1" presetClass="entr" presetSubtype="0" fill="hold" nodeType="withEffect">
-                                  <p:stCondLst>
-                                    <p:cond delay="0"/>
-                                  </p:stCondLst>
-                                  <p:childTnLst>
-                                    <p:set>
-                                      <p:cBhvr>
-                                        <p:cTn id="6" dur="1" fill="hold">
-                                          <p:stCondLst>
-                                            <p:cond delay="0"/>
-                                          </p:stCondLst>
-                                        </p:cTn>
-                                        <p:tgtEl>
-                                          <p:spTgt spid="3">
-                                            <p:txEl>
-                                              <p:pRg st="0" end="0"/>
-                                            </p:txEl>
-                                          </p:spTgt>
-                                        </p:tgtEl>
-                                        <p:attrNameLst>
-                                          <p:attrName>style.visibility</p:attrName>
-                                        </p:attrNameLst>
-                                      </p:cBhvr>
-                                      <p:to>
-                                        <p:strVal val="visible"/>
-                                      </p:to>
-                                    </p:set>
-                                  </p:childTnLst>
-                                </p:cTn>
-                              </p:par>
-                            </p:childTnLst>
-                          </p:cTn>
-                        </p:par>
-                      </p:childTnLst>
-                    </p:cTn>
-                  </p:par>
-                  <p:par>
-                    <p:cTn id="7" fill="hold">
-                      <p:stCondLst>
-                        <p:cond delay="indefinite"/>
-                      </p:stCondLst>
-                      <p:childTnLst>
-                        <p:par>
-                          <p:cTn id="8" fill="hold">
-                            <p:stCondLst>
-                              <p:cond delay="0"/>
-                            </p:stCondLst>
-                            <p:childTnLst>
-                              <p:par>
-                                <p:cTn id="9" presetID="1" presetClass="entr" presetSubtype="0" fill="hold" nodeType="clickEffect">
-                                  <p:stCondLst>
-                                    <p:cond delay="0"/>
-                                  </p:stCondLst>
-                                  <p:childTnLst>
-                                    <p:set>
-                                      <p:cBhvr>
-                                        <p:cTn id="10" dur="1" fill="hold">
-                                          <p:stCondLst>
-                                            <p:cond delay="0"/>
-                                          </p:stCondLst>
-                                        </p:cTn>
-                                        <p:tgtEl>
-                                          <p:spTgt spid="3">
-                                            <p:txEl>
-                                              <p:pRg st="1" end="1"/>
-                                            </p:txEl>
-                                          </p:spTgt>
-                                        </p:tgtEl>
-                                        <p:attrNameLst>
-                                          <p:attrName>style.visibility</p:attrName>
-                                        </p:attrNameLst>
-                                      </p:cBhvr>
-                                      <p:to>
-                                        <p:strVal val="visible"/>
-                                      </p:to>
-                                    </p:set>
-                                  </p:childTnLst>
-                                </p:cTn>
-                              </p:par>
-                            </p:childTnLst>
-                          </p:cTn>
-                        </p:par>
-                      </p:childTnLst>
-                    </p:cTn>
-                  </p:par>
-                  <p:par>
-                    <p:cTn id="11" fill="hold">
-                      <p:stCondLst>
-                        <p:cond delay="indefinite"/>
-                      </p:stCondLst>
-                      <p:childTnLst>
-                        <p:par>
-                          <p:cTn id="12" fill="hold">
-                            <p:stCondLst>
-                              <p:cond delay="0"/>
-                            </p:stCondLst>
-                            <p:childTnLst>
-                              <p:par>
-                                <p:cTn id="13" presetID="1" presetClass="entr" presetSubtype="0" fill="hold" nodeType="clickEffect">
-                                  <p:stCondLst>
-                                    <p:cond delay="0"/>
-                                  </p:stCondLst>
-                                  <p:childTnLst>
-                                    <p:set>
-                                      <p:cBhvr>
-                                        <p:cTn id="14" dur="1" fill="hold">
-                                          <p:stCondLst>
-                                            <p:cond delay="0"/>
-                                          </p:stCondLst>
-                                        </p:cTn>
-                                        <p:tgtEl>
-                                          <p:spTgt spid="3">
-                                            <p:txEl>
-                                              <p:pRg st="2" end="2"/>
-                                            </p:txEl>
-                                          </p:spTgt>
-                                        </p:tgtEl>
-                                        <p:attrNameLst>
-                                          <p:attrName>style.visibility</p:attrName>
-                                        </p:attrNameLst>
-                                      </p:cBhvr>
-                                      <p:to>
-                                        <p:strVal val="visible"/>
-                                      </p:to>
-                                    </p:set>
-                                  </p:childTnLst>
-                                </p:cTn>
-                              </p:par>
-                            </p:childTnLst>
-                          </p:cTn>
-                        </p:par>
-                      </p:childTnLst>
-                    </p:cTn>
-                  </p:par>
-                  <p:par>
-                    <p:cTn id="15" fill="hold">
-                      <p:stCondLst>
-                        <p:cond delay="indefinite"/>
-                      </p:stCondLst>
-                      <p:childTnLst>
-                        <p:par>
-                          <p:cTn id="16" fill="hold">
-                            <p:stCondLst>
-                              <p:cond delay="0"/>
-                            </p:stCondLst>
-                            <p:childTnLst>
-                              <p:par>
-                                <p:cTn id="17" presetID="1" presetClass="entr" presetSubtype="0" fill="hold" nodeType="clickEffect">
-                                  <p:stCondLst>
-                                    <p:cond delay="0"/>
-                                  </p:stCondLst>
-                                  <p:childTnLst>
-                                    <p:set>
-                                      <p:cBhvr>
-                                        <p:cTn id="18" dur="1" fill="hold">
-                                          <p:stCondLst>
-                                            <p:cond delay="0"/>
-                                          </p:stCondLst>
-                                        </p:cTn>
-                                        <p:tgtEl>
-                                          <p:spTgt spid="3">
-                                            <p:txEl>
-                                              <p:pRg st="3" end="3"/>
-                                            </p:txEl>
-                                          </p:spTgt>
-                                        </p:tgtEl>
-                                        <p:attrNameLst>
-                                          <p:attrName>style.visibility</p:attrName>
-                                        </p:attrNameLst>
-                                      </p:cBhvr>
-                                      <p:to>
-                                        <p:strVal val="visible"/>
-                                      </p:to>
-                                    </p:set>
-                                  </p:childTnLst>
-                                </p:cTn>
-                              </p:par>
-                            </p:childTnLst>
-                          </p:cTn>
-                        </p:par>
-                      </p:childTnLst>
-                    </p:cTn>
-                  </p:par>
-                  <p:par>
-                    <p:cTn id="19" fill="hold">
-                      <p:stCondLst>
-                        <p:cond delay="indefinite"/>
-                      </p:stCondLst>
-                      <p:childTnLst>
-                        <p:par>
-                          <p:cTn id="20" fill="hold">
-                            <p:stCondLst>
-                              <p:cond delay="0"/>
-                            </p:stCondLst>
-                            <p:childTnLst>
-                              <p:par>
-                                <p:cTn id="21" presetID="1" presetClass="entr" presetSubtype="0" fill="hold" nodeType="clickEffect">
-                                  <p:stCondLst>
-                                    <p:cond delay="0"/>
-                                  </p:stCondLst>
-                                  <p:childTnLst>
-                                    <p:set>
-                                      <p:cBhvr>
-                                        <p:cTn id="22" dur="1" fill="hold">
-                                          <p:stCondLst>
-                                            <p:cond delay="0"/>
-                                          </p:stCondLst>
-                                        </p:cTn>
-                                        <p:tgtEl>
-                                          <p:spTgt spid="3">
-                                            <p:txEl>
-                                              <p:pRg st="4" end="4"/>
-                                            </p:txEl>
-                                          </p:spTgt>
-                                        </p:tgtEl>
-                                        <p:attrNameLst>
-                                          <p:attrName>style.visibility</p:attrName>
-                                        </p:attrNameLst>
-                                      </p:cBhvr>
-                                      <p:to>
-                                        <p:strVal val="visible"/>
-                                      </p:to>
-                                    </p:set>
-                                  </p:childTnLst>
-                                </p:cTn>
-                              </p:par>
-                            </p:childTnLst>
-                          </p:cTn>
-                        </p:par>
-                      </p:childTnLst>
-                    </p:cTn>
-                  </p:par>
-                </p:childTnLst>
-              </p:cTn>
-              <p:prevCondLst>
-                <p:cond evt="onPrev" delay="0">
-                  <p:tgtEl>
-                    <p:sldTgt/>
-                  </p:tgtEl>
-                </p:cond>
-              </p:prevCondLst>
-              <p:nextCondLst>
-                <p:cond evt="onNext" delay="0">
-                  <p:tgtEl>
-                    <p:sldTgt/>
-                  </p:tgtEl>
-                </p:cond>
-              </p:nextCondLst>
-            </p:seq>
-          </p:childTnLst>
-        </p:cTn>
-      </p:par>
-    </p:tnLst>
-  </p:timing>
-</p:sld>
-</file>
-
-<file path=ppt/slides/slide3.xml><?xml version="1.0" encoding="utf-8"?>
 <p:sld xmlns:a="http://schemas.openxmlformats.org/drawingml/2006/main" xmlns:r="http://schemas.openxmlformats.org/officeDocument/2006/relationships" xmlns:p="http://schemas.openxmlformats.org/presentationml/2006/main">
   <p:cSld>
     <p:spTree>
@@ -16363,7 +14944,7 @@
         <p:spPr>
           <a:xfrm>
             <a:off x="1403648" y="5141184"/>
-            <a:ext cx="6028830" cy="830997"/>
+            <a:ext cx="6371873" cy="830997"/>
           </a:xfrm>
           <a:prstGeom prst="rect">
             <a:avLst/>
@@ -16400,7 +14981,7 @@
             </a:r>
             <a:r>
               <a:rPr lang="de-DE" sz="2400" dirty="0" err="1" smtClean="0"/>
-              <a:t>retweetet</a:t>
+              <a:t>geretweetet</a:t>
             </a:r>
             <a:r>
               <a:rPr lang="de-DE" sz="2400" dirty="0" smtClean="0"/>
@@ -16668,7 +15249,7 @@
 </p:sld>
 </file>
 
-<file path=ppt/slides/slide4.xml><?xml version="1.0" encoding="utf-8"?>
+<file path=ppt/slides/slide3.xml><?xml version="1.0" encoding="utf-8"?>
 <p:sld xmlns:a="http://schemas.openxmlformats.org/drawingml/2006/main" xmlns:r="http://schemas.openxmlformats.org/officeDocument/2006/relationships" xmlns:p="http://schemas.openxmlformats.org/presentationml/2006/main">
   <p:cSld>
     <p:spTree>
@@ -17651,7 +16232,7 @@
 </p:sld>
 </file>
 
-<file path=ppt/slides/slide5.xml><?xml version="1.0" encoding="utf-8"?>
+<file path=ppt/slides/slide4.xml><?xml version="1.0" encoding="utf-8"?>
 <p:sld xmlns:a="http://schemas.openxmlformats.org/drawingml/2006/main" xmlns:r="http://schemas.openxmlformats.org/officeDocument/2006/relationships" xmlns:p="http://schemas.openxmlformats.org/presentationml/2006/main">
   <p:cSld>
     <p:spTree>
@@ -17793,7 +16374,7 @@
 </p:sld>
 </file>
 
-<file path=ppt/slides/slide6.xml><?xml version="1.0" encoding="utf-8"?>
+<file path=ppt/slides/slide5.xml><?xml version="1.0" encoding="utf-8"?>
 <p:sld xmlns:a="http://schemas.openxmlformats.org/drawingml/2006/main" xmlns:r="http://schemas.openxmlformats.org/officeDocument/2006/relationships" xmlns:p="http://schemas.openxmlformats.org/presentationml/2006/main">
   <p:cSld>
     <p:spTree>
@@ -18165,7 +16746,7 @@
 </p:sld>
 </file>
 
-<file path=ppt/slides/slide7.xml><?xml version="1.0" encoding="utf-8"?>
+<file path=ppt/slides/slide6.xml><?xml version="1.0" encoding="utf-8"?>
 <p:sld xmlns:a="http://schemas.openxmlformats.org/drawingml/2006/main" xmlns:r="http://schemas.openxmlformats.org/officeDocument/2006/relationships" xmlns:p="http://schemas.openxmlformats.org/presentationml/2006/main">
   <p:cSld>
     <p:spTree>
@@ -18559,7 +17140,7 @@
 </p:sld>
 </file>
 
-<file path=ppt/slides/slide8.xml><?xml version="1.0" encoding="utf-8"?>
+<file path=ppt/slides/slide7.xml><?xml version="1.0" encoding="utf-8"?>
 <p:sld xmlns:a="http://schemas.openxmlformats.org/drawingml/2006/main" xmlns:r="http://schemas.openxmlformats.org/officeDocument/2006/relationships" xmlns:p="http://schemas.openxmlformats.org/presentationml/2006/main">
   <p:cSld>
     <p:spTree>
@@ -18606,7 +17187,7 @@
           <p:nvPr>
             <p:extLst>
               <p:ext uri="{D42A27DB-BD31-4B8C-83A1-F6EECF244321}">
-                <p14:modId xmlns:p14="http://schemas.microsoft.com/office/powerpoint/2010/main" val="1744096929"/>
+                <p14:modId xmlns:p14="http://schemas.microsoft.com/office/powerpoint/2010/main" val="3813931704"/>
               </p:ext>
             </p:extLst>
           </p:nvPr>
@@ -18715,9 +17296,6 @@
                     <p:cTn id="3" fill="hold">
                       <p:stCondLst>
                         <p:cond delay="indefinite"/>
-                        <p:cond evt="onBegin" delay="0">
-                          <p:tn val="2"/>
-                        </p:cond>
                       </p:stCondLst>
                       <p:childTnLst>
                         <p:par>
@@ -18727,7 +17305,7 @@
                             </p:stCondLst>
                             <p:childTnLst>
                               <p:par>
-                                <p:cTn id="5" presetID="1" presetClass="entr" presetSubtype="0" fill="hold" grpId="0" nodeType="withEffect">
+                                <p:cTn id="5" presetID="1" presetClass="entr" presetSubtype="0" fill="hold" grpId="0" nodeType="clickEffect">
                                   <p:stCondLst>
                                     <p:cond delay="0"/>
                                   </p:stCondLst>
@@ -18742,38 +17320,7 @@
                                         <p:tgtEl>
                                           <p:spTgt spid="5">
                                             <p:graphicEl>
-                                              <a:dgm id="{822618A0-FEEB-45CC-81A0-15FF6A91EB8A}"/>
-                                            </p:graphicEl>
-                                          </p:spTgt>
-                                        </p:tgtEl>
-                                        <p:attrNameLst>
-                                          <p:attrName>style.visibility</p:attrName>
-                                        </p:attrNameLst>
-                                      </p:cBhvr>
-                                      <p:to>
-                                        <p:strVal val="visible"/>
-                                      </p:to>
-                                    </p:set>
-                                  </p:childTnLst>
-                                </p:cTn>
-                              </p:par>
-                              <p:par>
-                                <p:cTn id="7" presetID="1" presetClass="entr" presetSubtype="0" fill="hold" grpId="0" nodeType="withEffect">
-                                  <p:stCondLst>
-                                    <p:cond delay="0"/>
-                                  </p:stCondLst>
-                                  <p:childTnLst>
-                                    <p:set>
-                                      <p:cBhvr>
-                                        <p:cTn id="8" dur="1" fill="hold">
-                                          <p:stCondLst>
-                                            <p:cond delay="0"/>
-                                          </p:stCondLst>
-                                        </p:cTn>
-                                        <p:tgtEl>
-                                          <p:spTgt spid="5">
-                                            <p:graphicEl>
-                                              <a:dgm id="{8A3B181F-EAC8-46DE-BBF3-BDB9DE3336EF}"/>
+                                              <a:dgm id="{FBEBD8BA-D6E5-44CB-BF4C-ED5FFBCFAFE5}"/>
                                             </p:graphicEl>
                                           </p:spTgt>
                                         </p:tgtEl>
@@ -18795,26 +17342,26 @@
                     </p:cTn>
                   </p:par>
                   <p:par>
-                    <p:cTn id="9" fill="hold">
+                    <p:cTn id="7" fill="hold">
                       <p:stCondLst>
                         <p:cond delay="indefinite"/>
                       </p:stCondLst>
                       <p:childTnLst>
                         <p:par>
-                          <p:cTn id="10" fill="hold">
+                          <p:cTn id="8" fill="hold">
                             <p:stCondLst>
                               <p:cond delay="0"/>
                             </p:stCondLst>
                             <p:childTnLst>
                               <p:par>
-                                <p:cTn id="11" presetID="1" presetClass="entr" presetSubtype="0" fill="hold" grpId="0" nodeType="clickEffect">
+                                <p:cTn id="9" presetID="1" presetClass="entr" presetSubtype="0" fill="hold" grpId="0" nodeType="clickEffect">
                                   <p:stCondLst>
                                     <p:cond delay="0"/>
                                   </p:stCondLst>
                                   <p:childTnLst>
                                     <p:set>
                                       <p:cBhvr>
-                                        <p:cTn id="12" dur="1" fill="hold">
+                                        <p:cTn id="10" dur="1" fill="hold">
                                           <p:stCondLst>
                                             <p:cond delay="0"/>
                                           </p:stCondLst>
@@ -18822,7 +17369,7 @@
                                         <p:tgtEl>
                                           <p:spTgt spid="5">
                                             <p:graphicEl>
-                                              <a:dgm id="{F0428DC1-2320-4439-BA06-F77B96603CEF}"/>
+                                              <a:dgm id="{3D4E2268-33F0-4680-9681-B22E2C1AB5F5}"/>
                                             </p:graphicEl>
                                           </p:spTgt>
                                         </p:tgtEl>
@@ -18844,26 +17391,26 @@
                     </p:cTn>
                   </p:par>
                   <p:par>
-                    <p:cTn id="13" fill="hold">
+                    <p:cTn id="11" fill="hold">
                       <p:stCondLst>
                         <p:cond delay="indefinite"/>
                       </p:stCondLst>
                       <p:childTnLst>
                         <p:par>
-                          <p:cTn id="14" fill="hold">
+                          <p:cTn id="12" fill="hold">
                             <p:stCondLst>
                               <p:cond delay="0"/>
                             </p:stCondLst>
                             <p:childTnLst>
                               <p:par>
-                                <p:cTn id="15" presetID="1" presetClass="entr" presetSubtype="0" fill="hold" grpId="0" nodeType="clickEffect">
+                                <p:cTn id="13" presetID="1" presetClass="entr" presetSubtype="0" fill="hold" grpId="0" nodeType="clickEffect">
                                   <p:stCondLst>
                                     <p:cond delay="0"/>
                                   </p:stCondLst>
                                   <p:childTnLst>
                                     <p:set>
                                       <p:cBhvr>
-                                        <p:cTn id="16" dur="1" fill="hold">
+                                        <p:cTn id="14" dur="1" fill="hold">
                                           <p:stCondLst>
                                             <p:cond delay="0"/>
                                           </p:stCondLst>
@@ -18871,7 +17418,7 @@
                                         <p:tgtEl>
                                           <p:spTgt spid="5">
                                             <p:graphicEl>
-                                              <a:dgm id="{24396DDF-2494-4281-972C-EDC799D3E3E7}"/>
+                                              <a:dgm id="{5122A87A-53A6-4237-A28C-C614EC7B2A57}"/>
                                             </p:graphicEl>
                                           </p:spTgt>
                                         </p:tgtEl>
@@ -18924,7 +17471,7 @@
 </p:sld>
 </file>
 
-<file path=ppt/slides/slide9.xml><?xml version="1.0" encoding="utf-8"?>
+<file path=ppt/slides/slide8.xml><?xml version="1.0" encoding="utf-8"?>
 <p:sld xmlns:a="http://schemas.openxmlformats.org/drawingml/2006/main" xmlns:r="http://schemas.openxmlformats.org/officeDocument/2006/relationships" xmlns:p="http://schemas.openxmlformats.org/presentationml/2006/main">
   <p:cSld>
     <p:spTree>
@@ -19068,6 +17615,278 @@
     </mc:Choice>
     <mc:Fallback xmlns="">
       <p:transition spd="slow"/>
+    </mc:Fallback>
+  </mc:AlternateContent>
+  <p:timing>
+    <p:tnLst>
+      <p:par>
+        <p:cTn id="1" dur="indefinite" restart="never" nodeType="tmRoot"/>
+      </p:par>
+    </p:tnLst>
+  </p:timing>
+</p:sld>
+</file>
+
+<file path=ppt/slides/slide9.xml><?xml version="1.0" encoding="utf-8"?>
+<p:sld xmlns:a="http://schemas.openxmlformats.org/drawingml/2006/main" xmlns:r="http://schemas.openxmlformats.org/officeDocument/2006/relationships" xmlns:p="http://schemas.openxmlformats.org/presentationml/2006/main">
+  <p:cSld>
+    <p:spTree>
+      <p:nvGrpSpPr>
+        <p:cNvPr id="1" name=""/>
+        <p:cNvGrpSpPr/>
+        <p:nvPr/>
+      </p:nvGrpSpPr>
+      <p:grpSpPr>
+        <a:xfrm>
+          <a:off x="0" y="0"/>
+          <a:ext cx="0" cy="0"/>
+          <a:chOff x="0" y="0"/>
+          <a:chExt cx="0" cy="0"/>
+        </a:xfrm>
+      </p:grpSpPr>
+      <p:pic>
+        <p:nvPicPr>
+          <p:cNvPr id="10" name="Grafik 9"/>
+          <p:cNvPicPr>
+            <a:picLocks noChangeAspect="1"/>
+          </p:cNvPicPr>
+          <p:nvPr/>
+        </p:nvPicPr>
+        <p:blipFill rotWithShape="1">
+          <a:blip r:embed="rId2" cstate="print">
+            <a:extLst>
+              <a:ext uri="{28A0092B-C50C-407E-A947-70E740481C1C}">
+                <a14:useLocalDpi xmlns:a14="http://schemas.microsoft.com/office/drawing/2010/main" val="0"/>
+              </a:ext>
+            </a:extLst>
+          </a:blip>
+          <a:srcRect l="21544" t="23529" r="48191" b="50000"/>
+          <a:stretch/>
+        </p:blipFill>
+        <p:spPr>
+          <a:xfrm>
+            <a:off x="1115616" y="1628800"/>
+            <a:ext cx="7272808" cy="4620372"/>
+          </a:xfrm>
+          <a:prstGeom prst="rect">
+            <a:avLst/>
+          </a:prstGeom>
+        </p:spPr>
+      </p:pic>
+      <p:sp>
+        <p:nvSpPr>
+          <p:cNvPr id="2" name="Titel 1"/>
+          <p:cNvSpPr>
+            <a:spLocks noGrp="1"/>
+          </p:cNvSpPr>
+          <p:nvPr>
+            <p:ph type="title"/>
+          </p:nvPr>
+        </p:nvSpPr>
+        <p:spPr/>
+        <p:txBody>
+          <a:bodyPr/>
+          <a:lstStyle/>
+          <a:p>
+            <a:r>
+              <a:rPr lang="de-DE" dirty="0" smtClean="0"/>
+              <a:t>2. Entwurf (Crawler)</a:t>
+            </a:r>
+            <a:endParaRPr lang="de-DE" dirty="0"/>
+          </a:p>
+        </p:txBody>
+      </p:sp>
+      <p:sp>
+        <p:nvSpPr>
+          <p:cNvPr id="21" name="Textfeld 20"/>
+          <p:cNvSpPr txBox="1"/>
+          <p:nvPr/>
+        </p:nvSpPr>
+        <p:spPr>
+          <a:xfrm>
+            <a:off x="6865632" y="1124744"/>
+            <a:ext cx="1306768" cy="292388"/>
+          </a:xfrm>
+          <a:prstGeom prst="rect">
+            <a:avLst/>
+          </a:prstGeom>
+          <a:solidFill>
+            <a:srgbClr val="FFFFFF"/>
+          </a:solidFill>
+          <a:ln w="12700">
+            <a:solidFill>
+              <a:schemeClr val="tx1"/>
+            </a:solidFill>
+          </a:ln>
+        </p:spPr>
+        <p:txBody>
+          <a:bodyPr wrap="none" rtlCol="0">
+            <a:spAutoFit/>
+          </a:bodyPr>
+          <a:lstStyle/>
+          <a:p>
+            <a:r>
+              <a:rPr lang="de-DE" sz="1300" u="sng" dirty="0" err="1" smtClean="0"/>
+              <a:t>dbc:DBCrawler</a:t>
+            </a:r>
+            <a:endParaRPr lang="de-DE" sz="1300" u="sng" dirty="0"/>
+          </a:p>
+        </p:txBody>
+      </p:sp>
+      <p:sp>
+        <p:nvSpPr>
+          <p:cNvPr id="22" name="Textfeld 21"/>
+          <p:cNvSpPr txBox="1"/>
+          <p:nvPr/>
+        </p:nvSpPr>
+        <p:spPr>
+          <a:xfrm>
+            <a:off x="5502758" y="1124744"/>
+            <a:ext cx="825867" cy="292388"/>
+          </a:xfrm>
+          <a:prstGeom prst="rect">
+            <a:avLst/>
+          </a:prstGeom>
+          <a:solidFill>
+            <a:srgbClr val="FFFFFF"/>
+          </a:solidFill>
+          <a:ln w="12700">
+            <a:solidFill>
+              <a:schemeClr val="tx1"/>
+            </a:solidFill>
+          </a:ln>
+        </p:spPr>
+        <p:txBody>
+          <a:bodyPr wrap="none" rtlCol="0">
+            <a:spAutoFit/>
+          </a:bodyPr>
+          <a:lstStyle/>
+          <a:p>
+            <a:r>
+              <a:rPr lang="de-DE" sz="1300" u="sng" dirty="0" smtClean="0"/>
+              <a:t>l:Locator</a:t>
+            </a:r>
+            <a:endParaRPr lang="de-DE" sz="1300" u="sng" dirty="0"/>
+          </a:p>
+        </p:txBody>
+      </p:sp>
+      <p:sp>
+        <p:nvSpPr>
+          <p:cNvPr id="25" name="Textfeld 24"/>
+          <p:cNvSpPr txBox="1"/>
+          <p:nvPr/>
+        </p:nvSpPr>
+        <p:spPr>
+          <a:xfrm>
+            <a:off x="2867718" y="1124744"/>
+            <a:ext cx="1957587" cy="292388"/>
+          </a:xfrm>
+          <a:prstGeom prst="rect">
+            <a:avLst/>
+          </a:prstGeom>
+          <a:solidFill>
+            <a:srgbClr val="FFFFFF"/>
+          </a:solidFill>
+          <a:ln w="12700">
+            <a:solidFill>
+              <a:schemeClr val="tx1"/>
+            </a:solidFill>
+          </a:ln>
+        </p:spPr>
+        <p:txBody>
+          <a:bodyPr wrap="none" rtlCol="0">
+            <a:spAutoFit/>
+          </a:bodyPr>
+          <a:lstStyle/>
+          <a:p>
+            <a:r>
+              <a:rPr lang="de-DE" sz="1300" u="sng" dirty="0" err="1" smtClean="0"/>
+              <a:t>worker:StatusProcessor</a:t>
+            </a:r>
+            <a:endParaRPr lang="de-DE" sz="1300" u="sng" dirty="0"/>
+          </a:p>
+        </p:txBody>
+      </p:sp>
+      <p:sp>
+        <p:nvSpPr>
+          <p:cNvPr id="9" name="Rectangle 12"/>
+          <p:cNvSpPr>
+            <a:spLocks noGrp="1" noChangeArrowheads="1"/>
+          </p:cNvSpPr>
+          <p:nvPr>
+            <p:ph type="ftr" sz="quarter" idx="10"/>
+          </p:nvPr>
+        </p:nvSpPr>
+        <p:spPr>
+          <a:xfrm>
+            <a:off x="611560" y="6443637"/>
+            <a:ext cx="7848871" cy="360363"/>
+          </a:xfrm>
+          <a:ln/>
+        </p:spPr>
+        <p:txBody>
+          <a:bodyPr/>
+          <a:lstStyle>
+            <a:lvl1pPr>
+              <a:defRPr sz="1000">
+                <a:solidFill>
+                  <a:schemeClr val="tx1"/>
+                </a:solidFill>
+                <a:latin typeface="Calibri" panose="020F0502020204030204" pitchFamily="34" charset="0"/>
+              </a:defRPr>
+            </a:lvl1pPr>
+          </a:lstStyle>
+          <a:p>
+            <a:pPr>
+              <a:defRPr/>
+            </a:pPr>
+            <a:r>
+              <a:rPr lang="de-DE" dirty="0" smtClean="0"/>
+              <a:t>Praxis der Softwareentwicklung: </a:t>
+            </a:r>
+            <a:r>
+              <a:rPr lang="de-DE" dirty="0" err="1" smtClean="0"/>
+              <a:t>Visualizing</a:t>
+            </a:r>
+            <a:r>
+              <a:rPr lang="de-DE" dirty="0" smtClean="0"/>
+              <a:t> Trends. Was verrät uns Twitter?</a:t>
+            </a:r>
+            <a:br>
+              <a:rPr lang="de-DE" dirty="0" smtClean="0"/>
+            </a:br>
+            <a:r>
+              <a:rPr lang="de-DE" dirty="0" smtClean="0"/>
+              <a:t>Aufgabenstellung               </a:t>
+            </a:r>
+            <a:r>
+              <a:rPr lang="de-DE" b="1" dirty="0" smtClean="0"/>
+              <a:t>Entwurf</a:t>
+            </a:r>
+            <a:r>
+              <a:rPr lang="de-DE" dirty="0" smtClean="0"/>
+              <a:t>		Implementierung		Validierung		Fazit</a:t>
+            </a:r>
+            <a:endParaRPr lang="de-DE" dirty="0"/>
+          </a:p>
+        </p:txBody>
+      </p:sp>
+    </p:spTree>
+    <p:extLst>
+      <p:ext uri="{BB962C8B-B14F-4D97-AF65-F5344CB8AC3E}">
+        <p14:creationId xmlns:p14="http://schemas.microsoft.com/office/powerpoint/2010/main" val="3591635622"/>
+      </p:ext>
+    </p:extLst>
+  </p:cSld>
+  <p:clrMapOvr>
+    <a:masterClrMapping/>
+  </p:clrMapOvr>
+  <mc:AlternateContent xmlns:mc="http://schemas.openxmlformats.org/markup-compatibility/2006" xmlns:p14="http://schemas.microsoft.com/office/powerpoint/2010/main">
+    <mc:Choice Requires="p14">
+      <p:transition p14:dur="0"/>
+    </mc:Choice>
+    <mc:Fallback xmlns="">
+      <p:transition/>
     </mc:Fallback>
   </mc:AlternateContent>
   <p:timing>

</xml_diff>